<commit_message>
updated print statements, title on vocab chart
</commit_message>
<xml_diff>
--- a/MSDS692_SOTU_Presentation_JeremyBeard.pptx
+++ b/MSDS692_SOTU_Presentation_JeremyBeard.pptx
@@ -5,10 +5,10 @@
     <p:sldMasterId id="2147483648" r:id="rId4"/>
   </p:sldMasterIdLst>
   <p:notesMasterIdLst>
-    <p:notesMasterId r:id="rId21"/>
+    <p:notesMasterId r:id="rId26"/>
   </p:notesMasterIdLst>
   <p:handoutMasterIdLst>
-    <p:handoutMasterId r:id="rId22"/>
+    <p:handoutMasterId r:id="rId27"/>
   </p:handoutMasterIdLst>
   <p:sldIdLst>
     <p:sldId id="256" r:id="rId5"/>
@@ -16,17 +16,22 @@
     <p:sldId id="258" r:id="rId7"/>
     <p:sldId id="291" r:id="rId8"/>
     <p:sldId id="287" r:id="rId9"/>
-    <p:sldId id="288" r:id="rId10"/>
-    <p:sldId id="289" r:id="rId11"/>
-    <p:sldId id="290" r:id="rId12"/>
-    <p:sldId id="261" r:id="rId13"/>
-    <p:sldId id="262" r:id="rId14"/>
-    <p:sldId id="283" r:id="rId15"/>
-    <p:sldId id="264" r:id="rId16"/>
-    <p:sldId id="266" r:id="rId17"/>
-    <p:sldId id="284" r:id="rId18"/>
-    <p:sldId id="267" r:id="rId19"/>
-    <p:sldId id="269" r:id="rId20"/>
+    <p:sldId id="292" r:id="rId10"/>
+    <p:sldId id="293" r:id="rId11"/>
+    <p:sldId id="295" r:id="rId12"/>
+    <p:sldId id="296" r:id="rId13"/>
+    <p:sldId id="297" r:id="rId14"/>
+    <p:sldId id="288" r:id="rId15"/>
+    <p:sldId id="289" r:id="rId16"/>
+    <p:sldId id="290" r:id="rId17"/>
+    <p:sldId id="261" r:id="rId18"/>
+    <p:sldId id="262" r:id="rId19"/>
+    <p:sldId id="283" r:id="rId20"/>
+    <p:sldId id="264" r:id="rId21"/>
+    <p:sldId id="266" r:id="rId22"/>
+    <p:sldId id="284" r:id="rId23"/>
+    <p:sldId id="267" r:id="rId24"/>
+    <p:sldId id="269" r:id="rId25"/>
   </p:sldIdLst>
   <p:sldSz cx="12192000" cy="6858000"/>
   <p:notesSz cx="6858000" cy="9144000"/>
@@ -150,7 +155,7 @@
 <file path=ppt/revisionInfo.xml><?xml version="1.0" encoding="utf-8"?>
 <p1510:revInfo xmlns:a="http://schemas.openxmlformats.org/drawingml/2006/main" xmlns:r="http://schemas.openxmlformats.org/officeDocument/2006/relationships" xmlns:p1510="http://schemas.microsoft.com/office/powerpoint/2015/10/main">
   <p1510:revLst>
-    <p1510:client id="{EFA81464-D118-4512-8B94-45E09A9EE7EF}" v="3" dt="2023-10-11T00:36:26.333"/>
+    <p1510:client id="{EFA81464-D118-4512-8B94-45E09A9EE7EF}" v="11" dt="2023-10-12T20:21:00.466"/>
   </p1510:revLst>
 </p1510:revInfo>
 </file>
@@ -159,19 +164,19 @@
 <pc:chgInfo xmlns:a="http://schemas.openxmlformats.org/drawingml/2006/main" xmlns:r="http://schemas.openxmlformats.org/officeDocument/2006/relationships" xmlns:ac="http://schemas.microsoft.com/office/drawing/2013/main/command" xmlns:pc="http://schemas.microsoft.com/office/powerpoint/2013/main/command">
   <pc:docChgLst>
     <pc:chgData name="Jeremy Beard" userId="9676edfc3f3b3502" providerId="LiveId" clId="{EFA81464-D118-4512-8B94-45E09A9EE7EF}"/>
-    <pc:docChg chg="custSel addSld delSld modSld">
-      <pc:chgData name="Jeremy Beard" userId="9676edfc3f3b3502" providerId="LiveId" clId="{EFA81464-D118-4512-8B94-45E09A9EE7EF}" dt="2023-10-11T00:42:33.211" v="207" actId="403"/>
+    <pc:docChg chg="undo custSel addSld delSld modSld">
+      <pc:chgData name="Jeremy Beard" userId="9676edfc3f3b3502" providerId="LiveId" clId="{EFA81464-D118-4512-8B94-45E09A9EE7EF}" dt="2023-10-12T20:31:01.467" v="2497" actId="14100"/>
       <pc:docMkLst>
         <pc:docMk/>
       </pc:docMkLst>
-      <pc:sldChg chg="modSp mod">
-        <pc:chgData name="Jeremy Beard" userId="9676edfc3f3b3502" providerId="LiveId" clId="{EFA81464-D118-4512-8B94-45E09A9EE7EF}" dt="2023-10-11T00:42:33.211" v="207" actId="403"/>
+      <pc:sldChg chg="addSp delSp modSp mod">
+        <pc:chgData name="Jeremy Beard" userId="9676edfc3f3b3502" providerId="LiveId" clId="{EFA81464-D118-4512-8B94-45E09A9EE7EF}" dt="2023-10-12T19:48:55.869" v="1243" actId="21"/>
         <pc:sldMkLst>
           <pc:docMk/>
           <pc:sldMk cId="3946934594" sldId="256"/>
         </pc:sldMkLst>
         <pc:spChg chg="mod">
-          <ac:chgData name="Jeremy Beard" userId="9676edfc3f3b3502" providerId="LiveId" clId="{EFA81464-D118-4512-8B94-45E09A9EE7EF}" dt="2023-10-11T00:42:28.632" v="205" actId="14100"/>
+          <ac:chgData name="Jeremy Beard" userId="9676edfc3f3b3502" providerId="LiveId" clId="{EFA81464-D118-4512-8B94-45E09A9EE7EF}" dt="2023-10-12T18:57:32.077" v="280" actId="1035"/>
           <ac:spMkLst>
             <pc:docMk/>
             <pc:sldMk cId="3946934594" sldId="256"/>
@@ -179,16 +184,63 @@
           </ac:spMkLst>
         </pc:spChg>
         <pc:spChg chg="mod">
-          <ac:chgData name="Jeremy Beard" userId="9676edfc3f3b3502" providerId="LiveId" clId="{EFA81464-D118-4512-8B94-45E09A9EE7EF}" dt="2023-10-11T00:42:33.211" v="207" actId="403"/>
+          <ac:chgData name="Jeremy Beard" userId="9676edfc3f3b3502" providerId="LiveId" clId="{EFA81464-D118-4512-8B94-45E09A9EE7EF}" dt="2023-10-12T18:58:03.545" v="324" actId="1036"/>
           <ac:spMkLst>
             <pc:docMk/>
             <pc:sldMk cId="3946934594" sldId="256"/>
             <ac:spMk id="3" creationId="{0D537F64-4C96-4AA8-BB21-E8053A3186DD}"/>
           </ac:spMkLst>
         </pc:spChg>
+        <pc:picChg chg="add mod modCrop">
+          <ac:chgData name="Jeremy Beard" userId="9676edfc3f3b3502" providerId="LiveId" clId="{EFA81464-D118-4512-8B94-45E09A9EE7EF}" dt="2023-10-12T18:57:56.808" v="287" actId="1076"/>
+          <ac:picMkLst>
+            <pc:docMk/>
+            <pc:sldMk cId="3946934594" sldId="256"/>
+            <ac:picMk id="5" creationId="{FDC892F5-F7FB-9104-E7B1-4EBAC4EC6D3C}"/>
+          </ac:picMkLst>
+        </pc:picChg>
+        <pc:picChg chg="add del mod">
+          <ac:chgData name="Jeremy Beard" userId="9676edfc3f3b3502" providerId="LiveId" clId="{EFA81464-D118-4512-8B94-45E09A9EE7EF}" dt="2023-10-12T19:48:55.869" v="1243" actId="21"/>
+          <ac:picMkLst>
+            <pc:docMk/>
+            <pc:sldMk cId="3946934594" sldId="256"/>
+            <ac:picMk id="7" creationId="{986DB2A9-5E67-0E4E-D32E-B73934AE5EFE}"/>
+          </ac:picMkLst>
+        </pc:picChg>
       </pc:sldChg>
-      <pc:sldChg chg="modSp mod">
-        <pc:chgData name="Jeremy Beard" userId="9676edfc3f3b3502" providerId="LiveId" clId="{EFA81464-D118-4512-8B94-45E09A9EE7EF}" dt="2023-10-10T03:10:08.900" v="124" actId="20577"/>
+      <pc:sldChg chg="addSp modSp add del mod">
+        <pc:chgData name="Jeremy Beard" userId="9676edfc3f3b3502" providerId="LiveId" clId="{EFA81464-D118-4512-8B94-45E09A9EE7EF}" dt="2023-10-12T19:50:07.334" v="1251" actId="404"/>
+        <pc:sldMkLst>
+          <pc:docMk/>
+          <pc:sldMk cId="2902794312" sldId="257"/>
+        </pc:sldMkLst>
+        <pc:spChg chg="mod">
+          <ac:chgData name="Jeremy Beard" userId="9676edfc3f3b3502" providerId="LiveId" clId="{EFA81464-D118-4512-8B94-45E09A9EE7EF}" dt="2023-10-12T19:50:07.334" v="1251" actId="404"/>
+          <ac:spMkLst>
+            <pc:docMk/>
+            <pc:sldMk cId="2902794312" sldId="257"/>
+            <ac:spMk id="4" creationId="{E3BD8413-C238-49D7-A4E1-E8FEF1811A0E}"/>
+          </ac:spMkLst>
+        </pc:spChg>
+        <pc:spChg chg="mod">
+          <ac:chgData name="Jeremy Beard" userId="9676edfc3f3b3502" providerId="LiveId" clId="{EFA81464-D118-4512-8B94-45E09A9EE7EF}" dt="2023-10-12T19:46:37.339" v="1236" actId="20577"/>
+          <ac:spMkLst>
+            <pc:docMk/>
+            <pc:sldMk cId="2902794312" sldId="257"/>
+            <ac:spMk id="5" creationId="{0A95F4DE-39B7-4CE2-BC1E-8B8AE662A895}"/>
+          </ac:spMkLst>
+        </pc:spChg>
+        <pc:picChg chg="add mod">
+          <ac:chgData name="Jeremy Beard" userId="9676edfc3f3b3502" providerId="LiveId" clId="{EFA81464-D118-4512-8B94-45E09A9EE7EF}" dt="2023-10-12T19:49:05.398" v="1246" actId="1076"/>
+          <ac:picMkLst>
+            <pc:docMk/>
+            <pc:sldMk cId="2902794312" sldId="257"/>
+            <ac:picMk id="3" creationId="{CB3A0D71-B2C0-7FCA-5FD5-EF615449D28F}"/>
+          </ac:picMkLst>
+        </pc:picChg>
+      </pc:sldChg>
+      <pc:sldChg chg="addSp modSp mod">
+        <pc:chgData name="Jeremy Beard" userId="9676edfc3f3b3502" providerId="LiveId" clId="{EFA81464-D118-4512-8B94-45E09A9EE7EF}" dt="2023-10-12T19:51:03.634" v="1287" actId="20577"/>
         <pc:sldMkLst>
           <pc:docMk/>
           <pc:sldMk cId="3733486012" sldId="258"/>
@@ -201,6 +253,22 @@
             <ac:spMk id="7" creationId="{7875C19A-1AAE-476A-A316-A2CF92D763D3}"/>
           </ac:spMkLst>
         </pc:spChg>
+        <pc:spChg chg="mod">
+          <ac:chgData name="Jeremy Beard" userId="9676edfc3f3b3502" providerId="LiveId" clId="{EFA81464-D118-4512-8B94-45E09A9EE7EF}" dt="2023-10-12T19:51:03.634" v="1287" actId="20577"/>
+          <ac:spMkLst>
+            <pc:docMk/>
+            <pc:sldMk cId="3733486012" sldId="258"/>
+            <ac:spMk id="10" creationId="{EF2BC084-E6DB-4DE7-B309-042A85EBA700}"/>
+          </ac:spMkLst>
+        </pc:spChg>
+        <pc:picChg chg="add mod modCrop">
+          <ac:chgData name="Jeremy Beard" userId="9676edfc3f3b3502" providerId="LiveId" clId="{EFA81464-D118-4512-8B94-45E09A9EE7EF}" dt="2023-10-12T19:42:29.130" v="1026" actId="1076"/>
+          <ac:picMkLst>
+            <pc:docMk/>
+            <pc:sldMk cId="3733486012" sldId="258"/>
+            <ac:picMk id="4" creationId="{058569F4-EFEF-A2BA-F4A9-8F2C16C38551}"/>
+          </ac:picMkLst>
+        </pc:picChg>
       </pc:sldChg>
       <pc:sldChg chg="del">
         <pc:chgData name="Jeremy Beard" userId="9676edfc3f3b3502" providerId="LiveId" clId="{EFA81464-D118-4512-8B94-45E09A9EE7EF}" dt="2023-10-11T00:35:08.457" v="149" actId="47"/>
@@ -245,8 +313,8 @@
           <pc:sldMk cId="232147223" sldId="286"/>
         </pc:sldMkLst>
       </pc:sldChg>
-      <pc:sldChg chg="modSp add mod">
-        <pc:chgData name="Jeremy Beard" userId="9676edfc3f3b3502" providerId="LiveId" clId="{EFA81464-D118-4512-8B94-45E09A9EE7EF}" dt="2023-10-10T03:10:18.750" v="133" actId="20577"/>
+      <pc:sldChg chg="addSp modSp add mod">
+        <pc:chgData name="Jeremy Beard" userId="9676edfc3f3b3502" providerId="LiveId" clId="{EFA81464-D118-4512-8B94-45E09A9EE7EF}" dt="2023-10-12T20:31:01.467" v="2497" actId="14100"/>
         <pc:sldMkLst>
           <pc:docMk/>
           <pc:sldMk cId="170903137" sldId="287"/>
@@ -259,9 +327,33 @@
             <ac:spMk id="7" creationId="{7875C19A-1AAE-476A-A316-A2CF92D763D3}"/>
           </ac:spMkLst>
         </pc:spChg>
+        <pc:spChg chg="mod">
+          <ac:chgData name="Jeremy Beard" userId="9676edfc3f3b3502" providerId="LiveId" clId="{EFA81464-D118-4512-8B94-45E09A9EE7EF}" dt="2023-10-12T20:31:01.467" v="2497" actId="14100"/>
+          <ac:spMkLst>
+            <pc:docMk/>
+            <pc:sldMk cId="170903137" sldId="287"/>
+            <ac:spMk id="10" creationId="{EF2BC084-E6DB-4DE7-B309-042A85EBA700}"/>
+          </ac:spMkLst>
+        </pc:spChg>
+        <pc:picChg chg="add mod">
+          <ac:chgData name="Jeremy Beard" userId="9676edfc3f3b3502" providerId="LiveId" clId="{EFA81464-D118-4512-8B94-45E09A9EE7EF}" dt="2023-10-12T20:24:10.749" v="2122" actId="1038"/>
+          <ac:picMkLst>
+            <pc:docMk/>
+            <pc:sldMk cId="170903137" sldId="287"/>
+            <ac:picMk id="4" creationId="{F0E27162-68C4-B8A5-8DB8-4918EE9A45B6}"/>
+          </ac:picMkLst>
+        </pc:picChg>
+        <pc:picChg chg="add mod">
+          <ac:chgData name="Jeremy Beard" userId="9676edfc3f3b3502" providerId="LiveId" clId="{EFA81464-D118-4512-8B94-45E09A9EE7EF}" dt="2023-10-12T20:30:16.996" v="2445" actId="1038"/>
+          <ac:picMkLst>
+            <pc:docMk/>
+            <pc:sldMk cId="170903137" sldId="287"/>
+            <ac:picMk id="6" creationId="{933AE526-D5C3-3A60-72F1-BCF3DC252DBC}"/>
+          </ac:picMkLst>
+        </pc:picChg>
       </pc:sldChg>
       <pc:sldChg chg="modSp add mod">
-        <pc:chgData name="Jeremy Beard" userId="9676edfc3f3b3502" providerId="LiveId" clId="{EFA81464-D118-4512-8B94-45E09A9EE7EF}" dt="2023-10-10T03:10:32.789" v="144" actId="20577"/>
+        <pc:chgData name="Jeremy Beard" userId="9676edfc3f3b3502" providerId="LiveId" clId="{EFA81464-D118-4512-8B94-45E09A9EE7EF}" dt="2023-10-12T20:15:03.436" v="2046" actId="14100"/>
         <pc:sldMkLst>
           <pc:docMk/>
           <pc:sldMk cId="4063189269" sldId="288"/>
@@ -274,9 +366,17 @@
             <ac:spMk id="7" creationId="{7875C19A-1AAE-476A-A316-A2CF92D763D3}"/>
           </ac:spMkLst>
         </pc:spChg>
+        <pc:spChg chg="mod">
+          <ac:chgData name="Jeremy Beard" userId="9676edfc3f3b3502" providerId="LiveId" clId="{EFA81464-D118-4512-8B94-45E09A9EE7EF}" dt="2023-10-12T20:15:03.436" v="2046" actId="14100"/>
+          <ac:spMkLst>
+            <pc:docMk/>
+            <pc:sldMk cId="4063189269" sldId="288"/>
+            <ac:spMk id="10" creationId="{EF2BC084-E6DB-4DE7-B309-042A85EBA700}"/>
+          </ac:spMkLst>
+        </pc:spChg>
       </pc:sldChg>
       <pc:sldChg chg="modSp add mod">
-        <pc:chgData name="Jeremy Beard" userId="9676edfc3f3b3502" providerId="LiveId" clId="{EFA81464-D118-4512-8B94-45E09A9EE7EF}" dt="2023-10-11T00:35:28.510" v="162" actId="20577"/>
+        <pc:chgData name="Jeremy Beard" userId="9676edfc3f3b3502" providerId="LiveId" clId="{EFA81464-D118-4512-8B94-45E09A9EE7EF}" dt="2023-10-12T20:10:38.848" v="2008" actId="20577"/>
         <pc:sldMkLst>
           <pc:docMk/>
           <pc:sldMk cId="1684049125" sldId="289"/>
@@ -289,9 +389,17 @@
             <ac:spMk id="7" creationId="{7875C19A-1AAE-476A-A316-A2CF92D763D3}"/>
           </ac:spMkLst>
         </pc:spChg>
+        <pc:spChg chg="mod">
+          <ac:chgData name="Jeremy Beard" userId="9676edfc3f3b3502" providerId="LiveId" clId="{EFA81464-D118-4512-8B94-45E09A9EE7EF}" dt="2023-10-12T20:10:38.848" v="2008" actId="20577"/>
+          <ac:spMkLst>
+            <pc:docMk/>
+            <pc:sldMk cId="1684049125" sldId="289"/>
+            <ac:spMk id="10" creationId="{EF2BC084-E6DB-4DE7-B309-042A85EBA700}"/>
+          </ac:spMkLst>
+        </pc:spChg>
       </pc:sldChg>
       <pc:sldChg chg="modSp add mod">
-        <pc:chgData name="Jeremy Beard" userId="9676edfc3f3b3502" providerId="LiveId" clId="{EFA81464-D118-4512-8B94-45E09A9EE7EF}" dt="2023-10-11T00:35:44.855" v="181" actId="20577"/>
+        <pc:chgData name="Jeremy Beard" userId="9676edfc3f3b3502" providerId="LiveId" clId="{EFA81464-D118-4512-8B94-45E09A9EE7EF}" dt="2023-10-12T19:52:39.576" v="1295"/>
         <pc:sldMkLst>
           <pc:docMk/>
           <pc:sldMk cId="1970689994" sldId="290"/>
@@ -304,13 +412,37 @@
             <ac:spMk id="7" creationId="{7875C19A-1AAE-476A-A316-A2CF92D763D3}"/>
           </ac:spMkLst>
         </pc:spChg>
+        <pc:spChg chg="mod">
+          <ac:chgData name="Jeremy Beard" userId="9676edfc3f3b3502" providerId="LiveId" clId="{EFA81464-D118-4512-8B94-45E09A9EE7EF}" dt="2023-10-12T19:52:39.576" v="1295"/>
+          <ac:spMkLst>
+            <pc:docMk/>
+            <pc:sldMk cId="1970689994" sldId="290"/>
+            <ac:spMk id="10" creationId="{EF2BC084-E6DB-4DE7-B309-042A85EBA700}"/>
+          </ac:spMkLst>
+        </pc:spChg>
       </pc:sldChg>
-      <pc:sldChg chg="modSp add mod">
-        <pc:chgData name="Jeremy Beard" userId="9676edfc3f3b3502" providerId="LiveId" clId="{EFA81464-D118-4512-8B94-45E09A9EE7EF}" dt="2023-10-11T00:36:32.120" v="202" actId="20577"/>
+      <pc:sldChg chg="addSp delSp modSp add mod">
+        <pc:chgData name="Jeremy Beard" userId="9676edfc3f3b3502" providerId="LiveId" clId="{EFA81464-D118-4512-8B94-45E09A9EE7EF}" dt="2023-10-12T19:44:57.343" v="1036" actId="1076"/>
         <pc:sldMkLst>
           <pc:docMk/>
           <pc:sldMk cId="374717039" sldId="291"/>
         </pc:sldMkLst>
+        <pc:spChg chg="add mod">
+          <ac:chgData name="Jeremy Beard" userId="9676edfc3f3b3502" providerId="LiveId" clId="{EFA81464-D118-4512-8B94-45E09A9EE7EF}" dt="2023-10-12T19:44:57.343" v="1036" actId="1076"/>
+          <ac:spMkLst>
+            <pc:docMk/>
+            <pc:sldMk cId="374717039" sldId="291"/>
+            <ac:spMk id="4" creationId="{6372AE50-B106-F099-BF0D-35AE9CBEA83F}"/>
+          </ac:spMkLst>
+        </pc:spChg>
+        <pc:spChg chg="add mod">
+          <ac:chgData name="Jeremy Beard" userId="9676edfc3f3b3502" providerId="LiveId" clId="{EFA81464-D118-4512-8B94-45E09A9EE7EF}" dt="2023-10-12T19:44:51.989" v="1035" actId="1076"/>
+          <ac:spMkLst>
+            <pc:docMk/>
+            <pc:sldMk cId="374717039" sldId="291"/>
+            <ac:spMk id="5" creationId="{1F8FB581-8EED-2E6E-25AD-207DF06A5700}"/>
+          </ac:spMkLst>
+        </pc:spChg>
         <pc:spChg chg="mod">
           <ac:chgData name="Jeremy Beard" userId="9676edfc3f3b3502" providerId="LiveId" clId="{EFA81464-D118-4512-8B94-45E09A9EE7EF}" dt="2023-10-11T00:36:32.120" v="202" actId="20577"/>
           <ac:spMkLst>
@@ -319,6 +451,80 @@
             <ac:spMk id="7" creationId="{7875C19A-1AAE-476A-A316-A2CF92D763D3}"/>
           </ac:spMkLst>
         </pc:spChg>
+        <pc:spChg chg="del">
+          <ac:chgData name="Jeremy Beard" userId="9676edfc3f3b3502" providerId="LiveId" clId="{EFA81464-D118-4512-8B94-45E09A9EE7EF}" dt="2023-10-12T19:25:57.851" v="700" actId="478"/>
+          <ac:spMkLst>
+            <pc:docMk/>
+            <pc:sldMk cId="374717039" sldId="291"/>
+            <ac:spMk id="10" creationId="{EF2BC084-E6DB-4DE7-B309-042A85EBA700}"/>
+          </ac:spMkLst>
+        </pc:spChg>
+      </pc:sldChg>
+      <pc:sldChg chg="modSp add mod">
+        <pc:chgData name="Jeremy Beard" userId="9676edfc3f3b3502" providerId="LiveId" clId="{EFA81464-D118-4512-8B94-45E09A9EE7EF}" dt="2023-10-12T20:17:54.741" v="2058" actId="20577"/>
+        <pc:sldMkLst>
+          <pc:docMk/>
+          <pc:sldMk cId="4233543114" sldId="292"/>
+        </pc:sldMkLst>
+        <pc:spChg chg="mod">
+          <ac:chgData name="Jeremy Beard" userId="9676edfc3f3b3502" providerId="LiveId" clId="{EFA81464-D118-4512-8B94-45E09A9EE7EF}" dt="2023-10-12T20:17:54.741" v="2058" actId="20577"/>
+          <ac:spMkLst>
+            <pc:docMk/>
+            <pc:sldMk cId="4233543114" sldId="292"/>
+            <ac:spMk id="10" creationId="{EF2BC084-E6DB-4DE7-B309-042A85EBA700}"/>
+          </ac:spMkLst>
+        </pc:spChg>
+      </pc:sldChg>
+      <pc:sldChg chg="modSp add mod">
+        <pc:chgData name="Jeremy Beard" userId="9676edfc3f3b3502" providerId="LiveId" clId="{EFA81464-D118-4512-8B94-45E09A9EE7EF}" dt="2023-10-12T20:19:00.220" v="2065" actId="6549"/>
+        <pc:sldMkLst>
+          <pc:docMk/>
+          <pc:sldMk cId="1328684943" sldId="293"/>
+        </pc:sldMkLst>
+        <pc:spChg chg="mod">
+          <ac:chgData name="Jeremy Beard" userId="9676edfc3f3b3502" providerId="LiveId" clId="{EFA81464-D118-4512-8B94-45E09A9EE7EF}" dt="2023-10-12T20:19:00.220" v="2065" actId="6549"/>
+          <ac:spMkLst>
+            <pc:docMk/>
+            <pc:sldMk cId="1328684943" sldId="293"/>
+            <ac:spMk id="10" creationId="{EF2BC084-E6DB-4DE7-B309-042A85EBA700}"/>
+          </ac:spMkLst>
+        </pc:spChg>
+      </pc:sldChg>
+      <pc:sldChg chg="add del">
+        <pc:chgData name="Jeremy Beard" userId="9676edfc3f3b3502" providerId="LiveId" clId="{EFA81464-D118-4512-8B94-45E09A9EE7EF}" dt="2023-10-12T20:18:20.917" v="2061" actId="47"/>
+        <pc:sldMkLst>
+          <pc:docMk/>
+          <pc:sldMk cId="235715090" sldId="294"/>
+        </pc:sldMkLst>
+      </pc:sldChg>
+      <pc:sldChg chg="modSp add mod">
+        <pc:chgData name="Jeremy Beard" userId="9676edfc3f3b3502" providerId="LiveId" clId="{EFA81464-D118-4512-8B94-45E09A9EE7EF}" dt="2023-10-12T20:18:53.351" v="2064" actId="6549"/>
+        <pc:sldMkLst>
+          <pc:docMk/>
+          <pc:sldMk cId="1790751634" sldId="295"/>
+        </pc:sldMkLst>
+        <pc:spChg chg="mod">
+          <ac:chgData name="Jeremy Beard" userId="9676edfc3f3b3502" providerId="LiveId" clId="{EFA81464-D118-4512-8B94-45E09A9EE7EF}" dt="2023-10-12T20:18:53.351" v="2064" actId="6549"/>
+          <ac:spMkLst>
+            <pc:docMk/>
+            <pc:sldMk cId="1790751634" sldId="295"/>
+            <ac:spMk id="10" creationId="{EF2BC084-E6DB-4DE7-B309-042A85EBA700}"/>
+          </ac:spMkLst>
+        </pc:spChg>
+      </pc:sldChg>
+      <pc:sldChg chg="add">
+        <pc:chgData name="Jeremy Beard" userId="9676edfc3f3b3502" providerId="LiveId" clId="{EFA81464-D118-4512-8B94-45E09A9EE7EF}" dt="2023-10-12T20:16:50.205" v="2053" actId="2890"/>
+        <pc:sldMkLst>
+          <pc:docMk/>
+          <pc:sldMk cId="387932245" sldId="296"/>
+        </pc:sldMkLst>
+      </pc:sldChg>
+      <pc:sldChg chg="add">
+        <pc:chgData name="Jeremy Beard" userId="9676edfc3f3b3502" providerId="LiveId" clId="{EFA81464-D118-4512-8B94-45E09A9EE7EF}" dt="2023-10-12T20:16:53.799" v="2054" actId="2890"/>
+        <pc:sldMkLst>
+          <pc:docMk/>
+          <pc:sldMk cId="2293198878" sldId="297"/>
+        </pc:sldMkLst>
       </pc:sldChg>
     </pc:docChg>
   </pc:docChgLst>
@@ -1330,7 +1536,7 @@
           <a:p>
             <a:fld id="{1CA5457B-CDAE-4DEB-AEC8-C82DE2312E37}" type="datetimeFigureOut">
               <a:rPr lang="en-US" smtClean="0"/>
-              <a:t>10/9/2023</a:t>
+              <a:t>10/12/2023</a:t>
             </a:fld>
             <a:endParaRPr lang="en-US" dirty="0"/>
           </a:p>
@@ -1507,7 +1713,7 @@
           <a:p>
             <a:fld id="{090B78EA-28CE-41D8-9043-90E391E5F567}" type="datetimeFigureOut">
               <a:rPr lang="en-US" noProof="0" smtClean="0"/>
-              <a:t>10/9/2023</a:t>
+              <a:t>10/12/2023</a:t>
             </a:fld>
             <a:endParaRPr lang="en-US" noProof="0" dirty="0"/>
           </a:p>
@@ -26573,7 +26779,7 @@
         </p:nvSpPr>
         <p:spPr>
           <a:xfrm>
-            <a:off x="2761488" y="2395728"/>
+            <a:off x="2761488" y="631582"/>
             <a:ext cx="8806328" cy="1243584"/>
           </a:xfrm>
         </p:spPr>
@@ -26606,7 +26812,7 @@
         </p:nvSpPr>
         <p:spPr>
           <a:xfrm>
-            <a:off x="2761488" y="3721608"/>
+            <a:off x="2761488" y="3001172"/>
             <a:ext cx="7077456" cy="1573406"/>
           </a:xfrm>
         </p:spPr>
@@ -26644,6 +26850,35 @@
           </a:p>
         </p:txBody>
       </p:sp>
+      <p:pic>
+        <p:nvPicPr>
+          <p:cNvPr id="5" name="Picture 4" descr="A close-up of words&#10;&#10;Description automatically generated">
+            <a:extLst>
+              <a:ext uri="{FF2B5EF4-FFF2-40B4-BE49-F238E27FC236}">
+                <a16:creationId xmlns:a16="http://schemas.microsoft.com/office/drawing/2014/main" id="{FDC892F5-F7FB-9104-E7B1-4EBAC4EC6D3C}"/>
+              </a:ext>
+            </a:extLst>
+          </p:cNvPr>
+          <p:cNvPicPr>
+            <a:picLocks noChangeAspect="1"/>
+          </p:cNvPicPr>
+          <p:nvPr/>
+        </p:nvPicPr>
+        <p:blipFill rotWithShape="1">
+          <a:blip r:embed="rId2"/>
+          <a:srcRect l="4210" t="3726" r="4545" b="4861"/>
+          <a:stretch/>
+        </p:blipFill>
+        <p:spPr>
+          <a:xfrm>
+            <a:off x="5527761" y="2281382"/>
+            <a:ext cx="6147004" cy="4105563"/>
+          </a:xfrm>
+          <a:prstGeom prst="rect">
+            <a:avLst/>
+          </a:prstGeom>
+        </p:spPr>
+      </p:pic>
     </p:spTree>
     <p:extLst>
       <p:ext uri="{BB962C8B-B14F-4D97-AF65-F5344CB8AC3E}">
@@ -26661,6 +26896,968 @@
 </file>
 
 <file path=ppt/slides/slide10.xml><?xml version="1.0" encoding="utf-8"?>
+<p:sld xmlns:a="http://schemas.openxmlformats.org/drawingml/2006/main" xmlns:r="http://schemas.openxmlformats.org/officeDocument/2006/relationships" xmlns:p="http://schemas.openxmlformats.org/presentationml/2006/main">
+  <p:cSld>
+    <p:spTree>
+      <p:nvGrpSpPr>
+        <p:cNvPr id="1" name=""/>
+        <p:cNvGrpSpPr/>
+        <p:nvPr/>
+      </p:nvGrpSpPr>
+      <p:grpSpPr>
+        <a:xfrm>
+          <a:off x="0" y="0"/>
+          <a:ext cx="0" cy="0"/>
+          <a:chOff x="0" y="0"/>
+          <a:chExt cx="0" cy="0"/>
+        </a:xfrm>
+      </p:grpSpPr>
+      <p:sp>
+        <p:nvSpPr>
+          <p:cNvPr id="7" name="Title 6">
+            <a:extLst>
+              <a:ext uri="{FF2B5EF4-FFF2-40B4-BE49-F238E27FC236}">
+                <a16:creationId xmlns:a16="http://schemas.microsoft.com/office/drawing/2014/main" id="{7875C19A-1AAE-476A-A316-A2CF92D763D3}"/>
+              </a:ext>
+            </a:extLst>
+          </p:cNvPr>
+          <p:cNvSpPr>
+            <a:spLocks noGrp="1"/>
+          </p:cNvSpPr>
+          <p:nvPr>
+            <p:ph type="title"/>
+          </p:nvPr>
+        </p:nvSpPr>
+        <p:spPr/>
+        <p:txBody>
+          <a:bodyPr/>
+          <a:lstStyle/>
+          <a:p>
+            <a:r>
+              <a:rPr lang="en-US" dirty="0"/>
+              <a:t>Results </a:t>
+            </a:r>
+          </a:p>
+        </p:txBody>
+      </p:sp>
+      <p:sp>
+        <p:nvSpPr>
+          <p:cNvPr id="10" name="Text Placeholder 9">
+            <a:extLst>
+              <a:ext uri="{FF2B5EF4-FFF2-40B4-BE49-F238E27FC236}">
+                <a16:creationId xmlns:a16="http://schemas.microsoft.com/office/drawing/2014/main" id="{EF2BC084-E6DB-4DE7-B309-042A85EBA700}"/>
+              </a:ext>
+            </a:extLst>
+          </p:cNvPr>
+          <p:cNvSpPr>
+            <a:spLocks noGrp="1"/>
+          </p:cNvSpPr>
+          <p:nvPr>
+            <p:ph type="body" sz="quarter" idx="13"/>
+          </p:nvPr>
+        </p:nvSpPr>
+        <p:spPr/>
+        <p:txBody>
+          <a:bodyPr/>
+          <a:lstStyle/>
+          <a:p>
+            <a:r>
+              <a:rPr lang="en-US" dirty="0"/>
+              <a:t>What is the quantitative positive/negative sentiment between all the speeches?</a:t>
+            </a:r>
+          </a:p>
+          <a:p>
+            <a:r>
+              <a:rPr lang="en-US" dirty="0"/>
+              <a:t>Which presidents use the widest variety of words?</a:t>
+            </a:r>
+          </a:p>
+          <a:p>
+            <a:r>
+              <a:rPr lang="en-US" dirty="0"/>
+              <a:t>What is the quantitative positive/negative sentiment between all the presidents?</a:t>
+            </a:r>
+          </a:p>
+          <a:p>
+            <a:r>
+              <a:rPr lang="en-US" dirty="0"/>
+              <a:t>What are the themes or buzzwords among the different speeches / presidents?</a:t>
+            </a:r>
+          </a:p>
+          <a:p>
+            <a:r>
+              <a:rPr lang="en-US" dirty="0"/>
+              <a:t>What were the most common words used in each speech?</a:t>
+            </a:r>
+          </a:p>
+          <a:p>
+            <a:r>
+              <a:rPr lang="en-US" dirty="0"/>
+              <a:t>Which presidents gave the longest speeches?</a:t>
+            </a:r>
+          </a:p>
+          <a:p>
+            <a:r>
+              <a:rPr lang="en-US" dirty="0"/>
+              <a:t>Which presidents gave the shortest speeches?</a:t>
+            </a:r>
+          </a:p>
+          <a:p>
+            <a:r>
+              <a:rPr lang="en-US" dirty="0"/>
+              <a:t>Which presidents used the most unique words?</a:t>
+            </a:r>
+          </a:p>
+          <a:p>
+            <a:r>
+              <a:rPr lang="en-US" dirty="0"/>
+              <a:t>Which presidents used the least unique words?</a:t>
+            </a:r>
+          </a:p>
+          <a:p>
+            <a:endParaRPr lang="en-US" dirty="0"/>
+          </a:p>
+          <a:p>
+            <a:endParaRPr lang="en-US" dirty="0"/>
+          </a:p>
+        </p:txBody>
+      </p:sp>
+      <p:sp>
+        <p:nvSpPr>
+          <p:cNvPr id="2" name="Slide Number Placeholder 1">
+            <a:extLst>
+              <a:ext uri="{FF2B5EF4-FFF2-40B4-BE49-F238E27FC236}">
+                <a16:creationId xmlns:a16="http://schemas.microsoft.com/office/drawing/2014/main" id="{BE9800F6-D571-48C4-8466-12AA1ADB6599}"/>
+              </a:ext>
+            </a:extLst>
+          </p:cNvPr>
+          <p:cNvSpPr>
+            <a:spLocks noGrp="1"/>
+          </p:cNvSpPr>
+          <p:nvPr>
+            <p:ph type="sldNum" sz="quarter" idx="12"/>
+          </p:nvPr>
+        </p:nvSpPr>
+        <p:spPr/>
+        <p:txBody>
+          <a:bodyPr/>
+          <a:lstStyle/>
+          <a:p>
+            <a:fld id="{C263D6C4-4840-40CC-AC84-17E24B3B7BDE}" type="slidenum">
+              <a:rPr lang="en-US" smtClean="0"/>
+              <a:pPr/>
+              <a:t>10</a:t>
+            </a:fld>
+            <a:endParaRPr lang="en-US" dirty="0"/>
+          </a:p>
+        </p:txBody>
+      </p:sp>
+    </p:spTree>
+    <p:extLst>
+      <p:ext uri="{BB962C8B-B14F-4D97-AF65-F5344CB8AC3E}">
+        <p14:creationId xmlns:p14="http://schemas.microsoft.com/office/powerpoint/2010/main" val="2293198878"/>
+      </p:ext>
+    </p:extLst>
+  </p:cSld>
+  <p:clrMapOvr>
+    <a:masterClrMapping/>
+  </p:clrMapOvr>
+  <mc:AlternateContent xmlns:mc="http://schemas.openxmlformats.org/markup-compatibility/2006">
+    <mc:Choice xmlns:p14="http://schemas.microsoft.com/office/powerpoint/2010/main" Requires="p14">
+      <p:transition spd="med" p14:dur="700">
+        <p:fade/>
+      </p:transition>
+    </mc:Choice>
+    <mc:Fallback>
+      <p:transition spd="med">
+        <p:fade/>
+      </p:transition>
+    </mc:Fallback>
+  </mc:AlternateContent>
+</p:sld>
+</file>
+
+<file path=ppt/slides/slide11.xml><?xml version="1.0" encoding="utf-8"?>
+<p:sld xmlns:a="http://schemas.openxmlformats.org/drawingml/2006/main" xmlns:r="http://schemas.openxmlformats.org/officeDocument/2006/relationships" xmlns:p="http://schemas.openxmlformats.org/presentationml/2006/main">
+  <p:cSld>
+    <p:spTree>
+      <p:nvGrpSpPr>
+        <p:cNvPr id="1" name=""/>
+        <p:cNvGrpSpPr/>
+        <p:nvPr/>
+      </p:nvGrpSpPr>
+      <p:grpSpPr>
+        <a:xfrm>
+          <a:off x="0" y="0"/>
+          <a:ext cx="0" cy="0"/>
+          <a:chOff x="0" y="0"/>
+          <a:chExt cx="0" cy="0"/>
+        </a:xfrm>
+      </p:grpSpPr>
+      <p:sp>
+        <p:nvSpPr>
+          <p:cNvPr id="7" name="Title 6">
+            <a:extLst>
+              <a:ext uri="{FF2B5EF4-FFF2-40B4-BE49-F238E27FC236}">
+                <a16:creationId xmlns:a16="http://schemas.microsoft.com/office/drawing/2014/main" id="{7875C19A-1AAE-476A-A316-A2CF92D763D3}"/>
+              </a:ext>
+            </a:extLst>
+          </p:cNvPr>
+          <p:cNvSpPr>
+            <a:spLocks noGrp="1"/>
+          </p:cNvSpPr>
+          <p:nvPr>
+            <p:ph type="title"/>
+          </p:nvPr>
+        </p:nvSpPr>
+        <p:spPr/>
+        <p:txBody>
+          <a:bodyPr/>
+          <a:lstStyle/>
+          <a:p>
+            <a:r>
+              <a:rPr lang="en-US" dirty="0"/>
+              <a:t>Conclusion</a:t>
+            </a:r>
+          </a:p>
+        </p:txBody>
+      </p:sp>
+      <p:sp>
+        <p:nvSpPr>
+          <p:cNvPr id="10" name="Text Placeholder 9">
+            <a:extLst>
+              <a:ext uri="{FF2B5EF4-FFF2-40B4-BE49-F238E27FC236}">
+                <a16:creationId xmlns:a16="http://schemas.microsoft.com/office/drawing/2014/main" id="{EF2BC084-E6DB-4DE7-B309-042A85EBA700}"/>
+              </a:ext>
+            </a:extLst>
+          </p:cNvPr>
+          <p:cNvSpPr>
+            <a:spLocks noGrp="1"/>
+          </p:cNvSpPr>
+          <p:nvPr>
+            <p:ph type="body" sz="quarter" idx="13"/>
+          </p:nvPr>
+        </p:nvSpPr>
+        <p:spPr>
+          <a:xfrm>
+            <a:off x="444500" y="1625385"/>
+            <a:ext cx="8051800" cy="4093243"/>
+          </a:xfrm>
+        </p:spPr>
+        <p:txBody>
+          <a:bodyPr/>
+          <a:lstStyle/>
+          <a:p>
+            <a:r>
+              <a:rPr lang="en-US" dirty="0"/>
+              <a:t>All questions were answered!</a:t>
+            </a:r>
+          </a:p>
+          <a:p>
+            <a:r>
+              <a:rPr lang="en-US" dirty="0"/>
+              <a:t>What is the quantitative positive/negative sentiment between all the speeches?</a:t>
+            </a:r>
+          </a:p>
+          <a:p>
+            <a:r>
+              <a:rPr lang="en-US" dirty="0"/>
+              <a:t>Which presidents use the widest variety of words?</a:t>
+            </a:r>
+          </a:p>
+          <a:p>
+            <a:r>
+              <a:rPr lang="en-US" dirty="0"/>
+              <a:t>What is the quantitative positive/negative sentiment between all the presidents?</a:t>
+            </a:r>
+          </a:p>
+          <a:p>
+            <a:r>
+              <a:rPr lang="en-US" dirty="0"/>
+              <a:t>What are the themes or buzzwords among the different speeches / presidents?</a:t>
+            </a:r>
+          </a:p>
+          <a:p>
+            <a:r>
+              <a:rPr lang="en-US" dirty="0"/>
+              <a:t>What were the most common words used in each speech?</a:t>
+            </a:r>
+          </a:p>
+          <a:p>
+            <a:r>
+              <a:rPr lang="en-US" dirty="0"/>
+              <a:t>Which presidents gave the longest speeches?</a:t>
+            </a:r>
+          </a:p>
+          <a:p>
+            <a:r>
+              <a:rPr lang="en-US" dirty="0"/>
+              <a:t>Which presidents gave the shortest speeches?</a:t>
+            </a:r>
+          </a:p>
+          <a:p>
+            <a:r>
+              <a:rPr lang="en-US" dirty="0"/>
+              <a:t>Which presidents used the most unique words?</a:t>
+            </a:r>
+          </a:p>
+          <a:p>
+            <a:r>
+              <a:rPr lang="en-US" dirty="0"/>
+              <a:t>Which presidents used the least unique words?</a:t>
+            </a:r>
+          </a:p>
+          <a:p>
+            <a:endParaRPr lang="en-US" dirty="0"/>
+          </a:p>
+          <a:p>
+            <a:endParaRPr lang="en-US" dirty="0"/>
+          </a:p>
+        </p:txBody>
+      </p:sp>
+      <p:sp>
+        <p:nvSpPr>
+          <p:cNvPr id="2" name="Slide Number Placeholder 1">
+            <a:extLst>
+              <a:ext uri="{FF2B5EF4-FFF2-40B4-BE49-F238E27FC236}">
+                <a16:creationId xmlns:a16="http://schemas.microsoft.com/office/drawing/2014/main" id="{BE9800F6-D571-48C4-8466-12AA1ADB6599}"/>
+              </a:ext>
+            </a:extLst>
+          </p:cNvPr>
+          <p:cNvSpPr>
+            <a:spLocks noGrp="1"/>
+          </p:cNvSpPr>
+          <p:nvPr>
+            <p:ph type="sldNum" sz="quarter" idx="12"/>
+          </p:nvPr>
+        </p:nvSpPr>
+        <p:spPr/>
+        <p:txBody>
+          <a:bodyPr/>
+          <a:lstStyle/>
+          <a:p>
+            <a:fld id="{C263D6C4-4840-40CC-AC84-17E24B3B7BDE}" type="slidenum">
+              <a:rPr lang="en-US" smtClean="0"/>
+              <a:pPr/>
+              <a:t>11</a:t>
+            </a:fld>
+            <a:endParaRPr lang="en-US" dirty="0"/>
+          </a:p>
+        </p:txBody>
+      </p:sp>
+    </p:spTree>
+    <p:extLst>
+      <p:ext uri="{BB962C8B-B14F-4D97-AF65-F5344CB8AC3E}">
+        <p14:creationId xmlns:p14="http://schemas.microsoft.com/office/powerpoint/2010/main" val="4063189269"/>
+      </p:ext>
+    </p:extLst>
+  </p:cSld>
+  <p:clrMapOvr>
+    <a:masterClrMapping/>
+  </p:clrMapOvr>
+  <mc:AlternateContent xmlns:mc="http://schemas.openxmlformats.org/markup-compatibility/2006" xmlns:p14="http://schemas.microsoft.com/office/powerpoint/2010/main">
+    <mc:Choice Requires="p14">
+      <p:transition spd="med" p14:dur="700">
+        <p:fade/>
+      </p:transition>
+    </mc:Choice>
+    <mc:Fallback xmlns="">
+      <p:transition spd="med">
+        <p:fade/>
+      </p:transition>
+    </mc:Fallback>
+  </mc:AlternateContent>
+</p:sld>
+</file>
+
+<file path=ppt/slides/slide12.xml><?xml version="1.0" encoding="utf-8"?>
+<p:sld xmlns:a="http://schemas.openxmlformats.org/drawingml/2006/main" xmlns:r="http://schemas.openxmlformats.org/officeDocument/2006/relationships" xmlns:p="http://schemas.openxmlformats.org/presentationml/2006/main">
+  <p:cSld>
+    <p:spTree>
+      <p:nvGrpSpPr>
+        <p:cNvPr id="1" name=""/>
+        <p:cNvGrpSpPr/>
+        <p:nvPr/>
+      </p:nvGrpSpPr>
+      <p:grpSpPr>
+        <a:xfrm>
+          <a:off x="0" y="0"/>
+          <a:ext cx="0" cy="0"/>
+          <a:chOff x="0" y="0"/>
+          <a:chExt cx="0" cy="0"/>
+        </a:xfrm>
+      </p:grpSpPr>
+      <p:sp>
+        <p:nvSpPr>
+          <p:cNvPr id="7" name="Title 6">
+            <a:extLst>
+              <a:ext uri="{FF2B5EF4-FFF2-40B4-BE49-F238E27FC236}">
+                <a16:creationId xmlns:a16="http://schemas.microsoft.com/office/drawing/2014/main" id="{7875C19A-1AAE-476A-A316-A2CF92D763D3}"/>
+              </a:ext>
+            </a:extLst>
+          </p:cNvPr>
+          <p:cNvSpPr>
+            <a:spLocks noGrp="1"/>
+          </p:cNvSpPr>
+          <p:nvPr>
+            <p:ph type="title"/>
+          </p:nvPr>
+        </p:nvSpPr>
+        <p:spPr/>
+        <p:txBody>
+          <a:bodyPr/>
+          <a:lstStyle/>
+          <a:p>
+            <a:r>
+              <a:rPr lang="en-US" dirty="0"/>
+              <a:t>Future Work</a:t>
+            </a:r>
+          </a:p>
+        </p:txBody>
+      </p:sp>
+      <p:sp>
+        <p:nvSpPr>
+          <p:cNvPr id="10" name="Text Placeholder 9">
+            <a:extLst>
+              <a:ext uri="{FF2B5EF4-FFF2-40B4-BE49-F238E27FC236}">
+                <a16:creationId xmlns:a16="http://schemas.microsoft.com/office/drawing/2014/main" id="{EF2BC084-E6DB-4DE7-B309-042A85EBA700}"/>
+              </a:ext>
+            </a:extLst>
+          </p:cNvPr>
+          <p:cNvSpPr>
+            <a:spLocks noGrp="1"/>
+          </p:cNvSpPr>
+          <p:nvPr>
+            <p:ph type="body" sz="quarter" idx="13"/>
+          </p:nvPr>
+        </p:nvSpPr>
+        <p:spPr/>
+        <p:txBody>
+          <a:bodyPr/>
+          <a:lstStyle/>
+          <a:p>
+            <a:r>
+              <a:rPr lang="en-US" dirty="0"/>
+              <a:t>This project was a huge learning experience for me! </a:t>
+            </a:r>
+          </a:p>
+          <a:p>
+            <a:r>
+              <a:rPr lang="en-US" dirty="0"/>
+              <a:t>Project selection in the beginning could have been better</a:t>
+            </a:r>
+          </a:p>
+          <a:p>
+            <a:r>
+              <a:rPr lang="en-US" dirty="0"/>
+              <a:t>State of the Union speech = very formal address, generally</a:t>
+            </a:r>
+          </a:p>
+          <a:p>
+            <a:pPr lvl="1"/>
+            <a:r>
+              <a:rPr lang="en-US" dirty="0"/>
+              <a:t>Differences aren’t as noticeable</a:t>
+            </a:r>
+          </a:p>
+          <a:p>
+            <a:r>
+              <a:rPr lang="en-US" dirty="0"/>
+              <a:t>Actions going forward for this project:</a:t>
+            </a:r>
+          </a:p>
+          <a:p>
+            <a:pPr lvl="1"/>
+            <a:r>
+              <a:rPr lang="en-US" dirty="0"/>
+              <a:t>Focus on ONE individual, develop prediction algorithm for that individual</a:t>
+            </a:r>
+          </a:p>
+          <a:p>
+            <a:pPr lvl="1"/>
+            <a:r>
+              <a:rPr lang="en-US" dirty="0"/>
+              <a:t>Source more informal text sources</a:t>
+            </a:r>
+          </a:p>
+          <a:p>
+            <a:pPr lvl="1"/>
+            <a:r>
+              <a:rPr lang="en-US" dirty="0"/>
+              <a:t>Create more interactive visualizations</a:t>
+            </a:r>
+          </a:p>
+          <a:p>
+            <a:pPr lvl="2"/>
+            <a:r>
+              <a:rPr lang="en-US" dirty="0"/>
+              <a:t>More variety needed</a:t>
+            </a:r>
+          </a:p>
+          <a:p>
+            <a:r>
+              <a:rPr lang="en-US" dirty="0"/>
+              <a:t>Actions going forward for next capstone:</a:t>
+            </a:r>
+          </a:p>
+          <a:p>
+            <a:pPr lvl="1"/>
+            <a:r>
+              <a:rPr lang="en-US" dirty="0"/>
+              <a:t>Focus on more numerical data</a:t>
+            </a:r>
+          </a:p>
+          <a:p>
+            <a:pPr lvl="1"/>
+            <a:r>
+              <a:rPr lang="en-US" dirty="0"/>
+              <a:t>Involve more prediction elements</a:t>
+            </a:r>
+          </a:p>
+          <a:p>
+            <a:pPr lvl="1"/>
+            <a:r>
+              <a:rPr lang="en-US" dirty="0"/>
+              <a:t>Cater more towards a business need (rather than personal curiosity)</a:t>
+            </a:r>
+          </a:p>
+          <a:p>
+            <a:pPr lvl="1"/>
+            <a:endParaRPr lang="en-US" dirty="0"/>
+          </a:p>
+        </p:txBody>
+      </p:sp>
+      <p:sp>
+        <p:nvSpPr>
+          <p:cNvPr id="2" name="Slide Number Placeholder 1">
+            <a:extLst>
+              <a:ext uri="{FF2B5EF4-FFF2-40B4-BE49-F238E27FC236}">
+                <a16:creationId xmlns:a16="http://schemas.microsoft.com/office/drawing/2014/main" id="{BE9800F6-D571-48C4-8466-12AA1ADB6599}"/>
+              </a:ext>
+            </a:extLst>
+          </p:cNvPr>
+          <p:cNvSpPr>
+            <a:spLocks noGrp="1"/>
+          </p:cNvSpPr>
+          <p:nvPr>
+            <p:ph type="sldNum" sz="quarter" idx="12"/>
+          </p:nvPr>
+        </p:nvSpPr>
+        <p:spPr/>
+        <p:txBody>
+          <a:bodyPr/>
+          <a:lstStyle/>
+          <a:p>
+            <a:fld id="{C263D6C4-4840-40CC-AC84-17E24B3B7BDE}" type="slidenum">
+              <a:rPr lang="en-US" smtClean="0"/>
+              <a:pPr/>
+              <a:t>12</a:t>
+            </a:fld>
+            <a:endParaRPr lang="en-US" dirty="0"/>
+          </a:p>
+        </p:txBody>
+      </p:sp>
+    </p:spTree>
+    <p:extLst>
+      <p:ext uri="{BB962C8B-B14F-4D97-AF65-F5344CB8AC3E}">
+        <p14:creationId xmlns:p14="http://schemas.microsoft.com/office/powerpoint/2010/main" val="1684049125"/>
+      </p:ext>
+    </p:extLst>
+  </p:cSld>
+  <p:clrMapOvr>
+    <a:masterClrMapping/>
+  </p:clrMapOvr>
+  <mc:AlternateContent xmlns:mc="http://schemas.openxmlformats.org/markup-compatibility/2006" xmlns:p14="http://schemas.microsoft.com/office/powerpoint/2010/main">
+    <mc:Choice Requires="p14">
+      <p:transition spd="med" p14:dur="700">
+        <p:fade/>
+      </p:transition>
+    </mc:Choice>
+    <mc:Fallback xmlns="">
+      <p:transition spd="med">
+        <p:fade/>
+      </p:transition>
+    </mc:Fallback>
+  </mc:AlternateContent>
+</p:sld>
+</file>
+
+<file path=ppt/slides/slide13.xml><?xml version="1.0" encoding="utf-8"?>
+<p:sld xmlns:a="http://schemas.openxmlformats.org/drawingml/2006/main" xmlns:r="http://schemas.openxmlformats.org/officeDocument/2006/relationships" xmlns:p="http://schemas.openxmlformats.org/presentationml/2006/main">
+  <p:cSld>
+    <p:spTree>
+      <p:nvGrpSpPr>
+        <p:cNvPr id="1" name=""/>
+        <p:cNvGrpSpPr/>
+        <p:nvPr/>
+      </p:nvGrpSpPr>
+      <p:grpSpPr>
+        <a:xfrm>
+          <a:off x="0" y="0"/>
+          <a:ext cx="0" cy="0"/>
+          <a:chOff x="0" y="0"/>
+          <a:chExt cx="0" cy="0"/>
+        </a:xfrm>
+      </p:grpSpPr>
+      <p:sp>
+        <p:nvSpPr>
+          <p:cNvPr id="7" name="Title 6">
+            <a:extLst>
+              <a:ext uri="{FF2B5EF4-FFF2-40B4-BE49-F238E27FC236}">
+                <a16:creationId xmlns:a16="http://schemas.microsoft.com/office/drawing/2014/main" id="{7875C19A-1AAE-476A-A316-A2CF92D763D3}"/>
+              </a:ext>
+            </a:extLst>
+          </p:cNvPr>
+          <p:cNvSpPr>
+            <a:spLocks noGrp="1"/>
+          </p:cNvSpPr>
+          <p:nvPr>
+            <p:ph type="title"/>
+          </p:nvPr>
+        </p:nvSpPr>
+        <p:spPr/>
+        <p:txBody>
+          <a:bodyPr/>
+          <a:lstStyle/>
+          <a:p>
+            <a:r>
+              <a:rPr lang="en-US" dirty="0"/>
+              <a:t>References</a:t>
+            </a:r>
+          </a:p>
+        </p:txBody>
+      </p:sp>
+      <p:sp>
+        <p:nvSpPr>
+          <p:cNvPr id="10" name="Text Placeholder 9">
+            <a:extLst>
+              <a:ext uri="{FF2B5EF4-FFF2-40B4-BE49-F238E27FC236}">
+                <a16:creationId xmlns:a16="http://schemas.microsoft.com/office/drawing/2014/main" id="{EF2BC084-E6DB-4DE7-B309-042A85EBA700}"/>
+              </a:ext>
+            </a:extLst>
+          </p:cNvPr>
+          <p:cNvSpPr>
+            <a:spLocks noGrp="1"/>
+          </p:cNvSpPr>
+          <p:nvPr>
+            <p:ph type="body" sz="quarter" idx="13"/>
+          </p:nvPr>
+        </p:nvSpPr>
+        <p:spPr/>
+        <p:txBody>
+          <a:bodyPr/>
+          <a:lstStyle/>
+          <a:p>
+            <a:r>
+              <a:rPr lang="en-US" dirty="0">
+                <a:hlinkClick r:id="rId2"/>
+              </a:rPr>
+              <a:t>https://www.kaggle.com/datasets/rtatman/state-of-the-union-corpus-1989-2017</a:t>
+            </a:r>
+          </a:p>
+          <a:p>
+            <a:r>
+              <a:rPr lang="en-US" dirty="0">
+                <a:hlinkClick r:id="rId2"/>
+              </a:rPr>
+              <a:t>https://thehill.com/homenews/administration/3848854-the-five-biggest-moments-from-bidens-state-of-the-union-address/</a:t>
+            </a:r>
+            <a:r>
+              <a:rPr lang="en-US" dirty="0"/>
+              <a:t> </a:t>
+            </a:r>
+          </a:p>
+        </p:txBody>
+      </p:sp>
+      <p:sp>
+        <p:nvSpPr>
+          <p:cNvPr id="2" name="Slide Number Placeholder 1">
+            <a:extLst>
+              <a:ext uri="{FF2B5EF4-FFF2-40B4-BE49-F238E27FC236}">
+                <a16:creationId xmlns:a16="http://schemas.microsoft.com/office/drawing/2014/main" id="{BE9800F6-D571-48C4-8466-12AA1ADB6599}"/>
+              </a:ext>
+            </a:extLst>
+          </p:cNvPr>
+          <p:cNvSpPr>
+            <a:spLocks noGrp="1"/>
+          </p:cNvSpPr>
+          <p:nvPr>
+            <p:ph type="sldNum" sz="quarter" idx="12"/>
+          </p:nvPr>
+        </p:nvSpPr>
+        <p:spPr/>
+        <p:txBody>
+          <a:bodyPr/>
+          <a:lstStyle/>
+          <a:p>
+            <a:fld id="{C263D6C4-4840-40CC-AC84-17E24B3B7BDE}" type="slidenum">
+              <a:rPr lang="en-US" smtClean="0"/>
+              <a:pPr/>
+              <a:t>13</a:t>
+            </a:fld>
+            <a:endParaRPr lang="en-US" dirty="0"/>
+          </a:p>
+        </p:txBody>
+      </p:sp>
+    </p:spTree>
+    <p:extLst>
+      <p:ext uri="{BB962C8B-B14F-4D97-AF65-F5344CB8AC3E}">
+        <p14:creationId xmlns:p14="http://schemas.microsoft.com/office/powerpoint/2010/main" val="1970689994"/>
+      </p:ext>
+    </p:extLst>
+  </p:cSld>
+  <p:clrMapOvr>
+    <a:masterClrMapping/>
+  </p:clrMapOvr>
+  <mc:AlternateContent xmlns:mc="http://schemas.openxmlformats.org/markup-compatibility/2006" xmlns:p14="http://schemas.microsoft.com/office/powerpoint/2010/main">
+    <mc:Choice Requires="p14">
+      <p:transition spd="med" p14:dur="700">
+        <p:fade/>
+      </p:transition>
+    </mc:Choice>
+    <mc:Fallback xmlns="">
+      <p:transition spd="med">
+        <p:fade/>
+      </p:transition>
+    </mc:Fallback>
+  </mc:AlternateContent>
+</p:sld>
+</file>
+
+<file path=ppt/slides/slide14.xml><?xml version="1.0" encoding="utf-8"?>
+<p:sld xmlns:a="http://schemas.openxmlformats.org/drawingml/2006/main" xmlns:r="http://schemas.openxmlformats.org/officeDocument/2006/relationships" xmlns:p="http://schemas.openxmlformats.org/presentationml/2006/main">
+  <p:cSld>
+    <p:spTree>
+      <p:nvGrpSpPr>
+        <p:cNvPr id="1" name=""/>
+        <p:cNvGrpSpPr/>
+        <p:nvPr/>
+      </p:nvGrpSpPr>
+      <p:grpSpPr>
+        <a:xfrm>
+          <a:off x="0" y="0"/>
+          <a:ext cx="0" cy="0"/>
+          <a:chOff x="0" y="0"/>
+          <a:chExt cx="0" cy="0"/>
+        </a:xfrm>
+      </p:grpSpPr>
+      <p:sp>
+        <p:nvSpPr>
+          <p:cNvPr id="4" name="Title 3">
+            <a:extLst>
+              <a:ext uri="{FF2B5EF4-FFF2-40B4-BE49-F238E27FC236}">
+                <a16:creationId xmlns:a16="http://schemas.microsoft.com/office/drawing/2014/main" id="{315E3981-F0D7-482C-A8E0-6A57700BECA7}"/>
+              </a:ext>
+            </a:extLst>
+          </p:cNvPr>
+          <p:cNvSpPr>
+            <a:spLocks noGrp="1"/>
+          </p:cNvSpPr>
+          <p:nvPr>
+            <p:ph type="title"/>
+          </p:nvPr>
+        </p:nvSpPr>
+        <p:spPr/>
+        <p:txBody>
+          <a:bodyPr/>
+          <a:lstStyle/>
+          <a:p>
+            <a:r>
+              <a:rPr lang="en-US" dirty="0"/>
+              <a:t>Content Title 02</a:t>
+            </a:r>
+          </a:p>
+        </p:txBody>
+      </p:sp>
+      <p:sp>
+        <p:nvSpPr>
+          <p:cNvPr id="2" name="Slide Number Placeholder 1">
+            <a:extLst>
+              <a:ext uri="{FF2B5EF4-FFF2-40B4-BE49-F238E27FC236}">
+                <a16:creationId xmlns:a16="http://schemas.microsoft.com/office/drawing/2014/main" id="{520FC4EE-F318-4344-9E3C-B950ADB63865}"/>
+              </a:ext>
+            </a:extLst>
+          </p:cNvPr>
+          <p:cNvSpPr>
+            <a:spLocks noGrp="1"/>
+          </p:cNvSpPr>
+          <p:nvPr>
+            <p:ph type="sldNum" sz="quarter" idx="12"/>
+          </p:nvPr>
+        </p:nvSpPr>
+        <p:spPr/>
+        <p:txBody>
+          <a:bodyPr/>
+          <a:lstStyle/>
+          <a:p>
+            <a:fld id="{C263D6C4-4840-40CC-AC84-17E24B3B7BDE}" type="slidenum">
+              <a:rPr lang="en-US" smtClean="0"/>
+              <a:pPr/>
+              <a:t>14</a:t>
+            </a:fld>
+            <a:endParaRPr lang="en-US" dirty="0"/>
+          </a:p>
+        </p:txBody>
+      </p:sp>
+      <p:sp>
+        <p:nvSpPr>
+          <p:cNvPr id="7" name="Text Placeholder 6">
+            <a:extLst>
+              <a:ext uri="{FF2B5EF4-FFF2-40B4-BE49-F238E27FC236}">
+                <a16:creationId xmlns:a16="http://schemas.microsoft.com/office/drawing/2014/main" id="{B74126B4-1E6C-4FFF-9282-40E18A85A07F}"/>
+              </a:ext>
+            </a:extLst>
+          </p:cNvPr>
+          <p:cNvSpPr>
+            <a:spLocks noGrp="1"/>
+          </p:cNvSpPr>
+          <p:nvPr>
+            <p:ph type="body" sz="quarter" idx="1"/>
+          </p:nvPr>
+        </p:nvSpPr>
+        <p:spPr/>
+        <p:txBody>
+          <a:bodyPr/>
+          <a:lstStyle/>
+          <a:p>
+            <a:r>
+              <a:rPr lang="en-US" dirty="0"/>
+              <a:t>Lorem ipsum dolor sit amet</a:t>
+            </a:r>
+          </a:p>
+        </p:txBody>
+      </p:sp>
+      <p:sp>
+        <p:nvSpPr>
+          <p:cNvPr id="5" name="Text Placeholder 4">
+            <a:extLst>
+              <a:ext uri="{FF2B5EF4-FFF2-40B4-BE49-F238E27FC236}">
+                <a16:creationId xmlns:a16="http://schemas.microsoft.com/office/drawing/2014/main" id="{E0C87788-476B-4620-8002-A5C1177AD6C1}"/>
+              </a:ext>
+            </a:extLst>
+          </p:cNvPr>
+          <p:cNvSpPr>
+            <a:spLocks noGrp="1"/>
+          </p:cNvSpPr>
+          <p:nvPr>
+            <p:ph type="body" sz="quarter" idx="3"/>
+          </p:nvPr>
+        </p:nvSpPr>
+        <p:spPr/>
+        <p:txBody>
+          <a:bodyPr/>
+          <a:lstStyle/>
+          <a:p>
+            <a:r>
+              <a:rPr lang="en-US" dirty="0"/>
+              <a:t>Lorem ipsum dolor sit amet</a:t>
+            </a:r>
+          </a:p>
+        </p:txBody>
+      </p:sp>
+      <p:sp>
+        <p:nvSpPr>
+          <p:cNvPr id="8" name="Text Placeholder 7">
+            <a:extLst>
+              <a:ext uri="{FF2B5EF4-FFF2-40B4-BE49-F238E27FC236}">
+                <a16:creationId xmlns:a16="http://schemas.microsoft.com/office/drawing/2014/main" id="{47DC4E62-1A34-4F98-A451-214F1808519C}"/>
+              </a:ext>
+            </a:extLst>
+          </p:cNvPr>
+          <p:cNvSpPr>
+            <a:spLocks noGrp="1"/>
+          </p:cNvSpPr>
+          <p:nvPr>
+            <p:ph type="body" sz="quarter" idx="2"/>
+          </p:nvPr>
+        </p:nvSpPr>
+        <p:spPr/>
+        <p:txBody>
+          <a:bodyPr/>
+          <a:lstStyle/>
+          <a:p>
+            <a:r>
+              <a:rPr lang="en-US" dirty="0"/>
+              <a:t>Lorem ipsum dolor sit amet, consectetuer adipiscing elit. Maecenas porttitor congue massa. Fusce posuere, magna sed pulvinar ultricies, purus lectus malesuada libero, sit amet commodo magna eros quis urna. Nunc viverra imperdiet enim. Fusce est. Vivamus a tellus.</a:t>
+            </a:r>
+          </a:p>
+          <a:p>
+            <a:r>
+              <a:rPr lang="en-US" dirty="0"/>
+              <a:t>Pellentesque habitant morbi tristique senectus et netus et malesuada fames ac turpis egestas. Proin pharetra nonummy pede. Mauris et orci.</a:t>
+            </a:r>
+          </a:p>
+          <a:p>
+            <a:endParaRPr lang="en-US" dirty="0"/>
+          </a:p>
+          <a:p>
+            <a:endParaRPr lang="en-US" dirty="0"/>
+          </a:p>
+        </p:txBody>
+      </p:sp>
+      <p:sp>
+        <p:nvSpPr>
+          <p:cNvPr id="6" name="Text Placeholder 5">
+            <a:extLst>
+              <a:ext uri="{FF2B5EF4-FFF2-40B4-BE49-F238E27FC236}">
+                <a16:creationId xmlns:a16="http://schemas.microsoft.com/office/drawing/2014/main" id="{000A9570-5EF6-4AFB-9FCA-7C8998E3FEB1}"/>
+              </a:ext>
+            </a:extLst>
+          </p:cNvPr>
+          <p:cNvSpPr>
+            <a:spLocks noGrp="1"/>
+          </p:cNvSpPr>
+          <p:nvPr>
+            <p:ph type="body" sz="quarter" idx="4"/>
+          </p:nvPr>
+        </p:nvSpPr>
+        <p:spPr/>
+        <p:txBody>
+          <a:bodyPr/>
+          <a:lstStyle/>
+          <a:p>
+            <a:r>
+              <a:rPr lang="en-US" dirty="0"/>
+              <a:t>Lorem ipsum dolor sit amet, consectetuer adipiscing elit. Maecenas porttitor congue massa. Fusce posuere, magna sed pulvinar ultricies, purus lectus malesuada libero, sit amet commodo magna eros quis urna. Nunc viverra imperdiet enim. Fusce est. Vivamus a tellus.</a:t>
+            </a:r>
+          </a:p>
+          <a:p>
+            <a:r>
+              <a:rPr lang="en-US" dirty="0"/>
+              <a:t>Pellentesque habitant morbi tristique senectus et netus et malesuada fames ac turpis egestas. Proin pharetra nonummy pede. Mauris et orci.</a:t>
+            </a:r>
+          </a:p>
+          <a:p>
+            <a:endParaRPr lang="en-US" dirty="0"/>
+          </a:p>
+        </p:txBody>
+      </p:sp>
+    </p:spTree>
+    <p:extLst>
+      <p:ext uri="{BB962C8B-B14F-4D97-AF65-F5344CB8AC3E}">
+        <p14:creationId xmlns:p14="http://schemas.microsoft.com/office/powerpoint/2010/main" val="3607270498"/>
+      </p:ext>
+    </p:extLst>
+  </p:cSld>
+  <p:clrMapOvr>
+    <a:masterClrMapping/>
+  </p:clrMapOvr>
+  <mc:AlternateContent xmlns:mc="http://schemas.openxmlformats.org/markup-compatibility/2006" xmlns:p14="http://schemas.microsoft.com/office/powerpoint/2010/main">
+    <mc:Choice Requires="p14">
+      <p:transition spd="med" p14:dur="700">
+        <p:fade/>
+      </p:transition>
+    </mc:Choice>
+    <mc:Fallback xmlns="">
+      <p:transition spd="med">
+        <p:fade/>
+      </p:transition>
+    </mc:Fallback>
+  </mc:AlternateContent>
+</p:sld>
+</file>
+
+<file path=ppt/slides/slide15.xml><?xml version="1.0" encoding="utf-8"?>
 <p:sld xmlns:a="http://schemas.openxmlformats.org/drawingml/2006/main" xmlns:r="http://schemas.openxmlformats.org/officeDocument/2006/relationships" xmlns:p="http://schemas.openxmlformats.org/presentationml/2006/main">
   <p:cSld>
     <p:spTree>
@@ -27044,7 +28241,7 @@
             <a:fld id="{C263D6C4-4840-40CC-AC84-17E24B3B7BDE}" type="slidenum">
               <a:rPr lang="en-US" smtClean="0"/>
               <a:pPr/>
-              <a:t>10</a:t>
+              <a:t>15</a:t>
             </a:fld>
             <a:endParaRPr lang="en-US" dirty="0"/>
           </a:p>
@@ -27075,7 +28272,7 @@
 </p:sld>
 </file>
 
-<file path=ppt/slides/slide11.xml><?xml version="1.0" encoding="utf-8"?>
+<file path=ppt/slides/slide16.xml><?xml version="1.0" encoding="utf-8"?>
 <p:sld xmlns:a="http://schemas.openxmlformats.org/drawingml/2006/main" xmlns:r="http://schemas.openxmlformats.org/officeDocument/2006/relationships" xmlns:p="http://schemas.openxmlformats.org/presentationml/2006/main">
   <p:cSld>
     <p:spTree>
@@ -27259,7 +28456,7 @@
             <a:fld id="{C263D6C4-4840-40CC-AC84-17E24B3B7BDE}" type="slidenum">
               <a:rPr lang="en-US" smtClean="0"/>
               <a:pPr/>
-              <a:t>11</a:t>
+              <a:t>16</a:t>
             </a:fld>
             <a:endParaRPr lang="en-US" dirty="0"/>
           </a:p>
@@ -27290,7 +28487,7 @@
 </p:sld>
 </file>
 
-<file path=ppt/slides/slide12.xml><?xml version="1.0" encoding="utf-8"?>
+<file path=ppt/slides/slide17.xml><?xml version="1.0" encoding="utf-8"?>
 <p:sld xmlns:a="http://schemas.openxmlformats.org/drawingml/2006/main" xmlns:r="http://schemas.openxmlformats.org/officeDocument/2006/relationships" xmlns:p="http://schemas.openxmlformats.org/presentationml/2006/main">
   <p:cSld>
     <p:spTree>
@@ -27427,7 +28624,7 @@
             <a:fld id="{C263D6C4-4840-40CC-AC84-17E24B3B7BDE}" type="slidenum">
               <a:rPr lang="en-US" smtClean="0"/>
               <a:pPr/>
-              <a:t>12</a:t>
+              <a:t>17</a:t>
             </a:fld>
             <a:endParaRPr lang="en-US" dirty="0"/>
           </a:p>
@@ -27458,7 +28655,7 @@
 </p:sld>
 </file>
 
-<file path=ppt/slides/slide13.xml><?xml version="1.0" encoding="utf-8"?>
+<file path=ppt/slides/slide18.xml><?xml version="1.0" encoding="utf-8"?>
 <p:sld xmlns:a="http://schemas.openxmlformats.org/drawingml/2006/main" xmlns:r="http://schemas.openxmlformats.org/officeDocument/2006/relationships" xmlns:p="http://schemas.openxmlformats.org/presentationml/2006/main">
   <p:cSld>
     <p:spTree>
@@ -29348,7 +30545,7 @@
             <a:fld id="{C263D6C4-4840-40CC-AC84-17E24B3B7BDE}" type="slidenum">
               <a:rPr lang="en-US" smtClean="0"/>
               <a:pPr/>
-              <a:t>13</a:t>
+              <a:t>18</a:t>
             </a:fld>
             <a:endParaRPr lang="en-US" dirty="0"/>
           </a:p>
@@ -29379,7 +30576,7 @@
 </p:sld>
 </file>
 
-<file path=ppt/slides/slide14.xml><?xml version="1.0" encoding="utf-8"?>
+<file path=ppt/slides/slide19.xml><?xml version="1.0" encoding="utf-8"?>
 <p:sld xmlns:a="http://schemas.openxmlformats.org/drawingml/2006/main" xmlns:r="http://schemas.openxmlformats.org/officeDocument/2006/relationships" xmlns:p="http://schemas.openxmlformats.org/presentationml/2006/main">
   <p:cSld>
     <p:spTree>
@@ -29476,7 +30673,7 @@
             <a:fld id="{C263D6C4-4840-40CC-AC84-17E24B3B7BDE}" type="slidenum">
               <a:rPr lang="en-US" smtClean="0"/>
               <a:pPr/>
-              <a:t>14</a:t>
+              <a:t>19</a:t>
             </a:fld>
             <a:endParaRPr lang="en-US" dirty="0"/>
           </a:p>
@@ -29507,7 +30704,233 @@
 </p:sld>
 </file>
 
-<file path=ppt/slides/slide15.xml><?xml version="1.0" encoding="utf-8"?>
+<file path=ppt/slides/slide2.xml><?xml version="1.0" encoding="utf-8"?>
+<p:sld xmlns:a="http://schemas.openxmlformats.org/drawingml/2006/main" xmlns:r="http://schemas.openxmlformats.org/officeDocument/2006/relationships" xmlns:p="http://schemas.openxmlformats.org/presentationml/2006/main">
+  <p:cSld>
+    <p:spTree>
+      <p:nvGrpSpPr>
+        <p:cNvPr id="1" name=""/>
+        <p:cNvGrpSpPr/>
+        <p:nvPr/>
+      </p:nvGrpSpPr>
+      <p:grpSpPr>
+        <a:xfrm>
+          <a:off x="0" y="0"/>
+          <a:ext cx="0" cy="0"/>
+          <a:chOff x="0" y="0"/>
+          <a:chExt cx="0" cy="0"/>
+        </a:xfrm>
+      </p:grpSpPr>
+      <p:sp>
+        <p:nvSpPr>
+          <p:cNvPr id="4" name="Title 3">
+            <a:extLst>
+              <a:ext uri="{FF2B5EF4-FFF2-40B4-BE49-F238E27FC236}">
+                <a16:creationId xmlns:a16="http://schemas.microsoft.com/office/drawing/2014/main" id="{E3BD8413-C238-49D7-A4E1-E8FEF1811A0E}"/>
+              </a:ext>
+            </a:extLst>
+          </p:cNvPr>
+          <p:cNvSpPr>
+            <a:spLocks noGrp="1"/>
+          </p:cNvSpPr>
+          <p:nvPr>
+            <p:ph type="title"/>
+          </p:nvPr>
+        </p:nvSpPr>
+        <p:spPr>
+          <a:xfrm>
+            <a:off x="832104" y="1053190"/>
+            <a:ext cx="7781544" cy="859055"/>
+          </a:xfrm>
+        </p:spPr>
+        <p:txBody>
+          <a:bodyPr>
+            <a:normAutofit/>
+          </a:bodyPr>
+          <a:lstStyle/>
+          <a:p>
+            <a:r>
+              <a:rPr lang="en-US" sz="3200" dirty="0"/>
+              <a:t>Presentation Flow</a:t>
+            </a:r>
+          </a:p>
+        </p:txBody>
+      </p:sp>
+      <p:sp>
+        <p:nvSpPr>
+          <p:cNvPr id="5" name="Text Placeholder 4">
+            <a:extLst>
+              <a:ext uri="{FF2B5EF4-FFF2-40B4-BE49-F238E27FC236}">
+                <a16:creationId xmlns:a16="http://schemas.microsoft.com/office/drawing/2014/main" id="{0A95F4DE-39B7-4CE2-BC1E-8B8AE662A895}"/>
+              </a:ext>
+            </a:extLst>
+          </p:cNvPr>
+          <p:cNvSpPr>
+            <a:spLocks noGrp="1"/>
+          </p:cNvSpPr>
+          <p:nvPr>
+            <p:ph type="body" idx="1"/>
+          </p:nvPr>
+        </p:nvSpPr>
+        <p:spPr>
+          <a:xfrm>
+            <a:off x="831850" y="2419891"/>
+            <a:ext cx="6803136" cy="3099165"/>
+          </a:xfrm>
+        </p:spPr>
+        <p:txBody>
+          <a:bodyPr>
+            <a:normAutofit/>
+          </a:bodyPr>
+          <a:lstStyle/>
+          <a:p>
+            <a:pPr marL="285750" indent="-285750">
+              <a:buFont typeface="Arial" panose="020B0604020202020204" pitchFamily="34" charset="0"/>
+              <a:buChar char="•"/>
+            </a:pPr>
+            <a:r>
+              <a:rPr lang="en-US" dirty="0"/>
+              <a:t>Introduction</a:t>
+            </a:r>
+          </a:p>
+          <a:p>
+            <a:pPr marL="285750" indent="-285750">
+              <a:buFont typeface="Arial" panose="020B0604020202020204" pitchFamily="34" charset="0"/>
+              <a:buChar char="•"/>
+            </a:pPr>
+            <a:r>
+              <a:rPr lang="en-US" dirty="0"/>
+              <a:t>Methods and Approach</a:t>
+            </a:r>
+          </a:p>
+          <a:p>
+            <a:pPr marL="285750" indent="-285750">
+              <a:buFont typeface="Arial" panose="020B0604020202020204" pitchFamily="34" charset="0"/>
+              <a:buChar char="•"/>
+            </a:pPr>
+            <a:r>
+              <a:rPr lang="en-US" dirty="0"/>
+              <a:t>Results</a:t>
+            </a:r>
+          </a:p>
+          <a:p>
+            <a:pPr marL="285750" indent="-285750">
+              <a:buFont typeface="Arial" panose="020B0604020202020204" pitchFamily="34" charset="0"/>
+              <a:buChar char="•"/>
+            </a:pPr>
+            <a:r>
+              <a:rPr lang="en-US" dirty="0"/>
+              <a:t>Conclusion</a:t>
+            </a:r>
+          </a:p>
+          <a:p>
+            <a:pPr marL="285750" indent="-285750">
+              <a:buFont typeface="Arial" panose="020B0604020202020204" pitchFamily="34" charset="0"/>
+              <a:buChar char="•"/>
+            </a:pPr>
+            <a:r>
+              <a:rPr lang="en-US" dirty="0"/>
+              <a:t>Future Work</a:t>
+            </a:r>
+          </a:p>
+          <a:p>
+            <a:pPr marL="285750" indent="-285750">
+              <a:buFont typeface="Arial" panose="020B0604020202020204" pitchFamily="34" charset="0"/>
+              <a:buChar char="•"/>
+            </a:pPr>
+            <a:r>
+              <a:rPr lang="en-US" dirty="0"/>
+              <a:t>References</a:t>
+            </a:r>
+          </a:p>
+        </p:txBody>
+      </p:sp>
+      <p:sp>
+        <p:nvSpPr>
+          <p:cNvPr id="2" name="Slide Number Placeholder 1">
+            <a:extLst>
+              <a:ext uri="{FF2B5EF4-FFF2-40B4-BE49-F238E27FC236}">
+                <a16:creationId xmlns:a16="http://schemas.microsoft.com/office/drawing/2014/main" id="{0B24BF10-2B55-43AB-9F77-F1A1410384A9}"/>
+              </a:ext>
+            </a:extLst>
+          </p:cNvPr>
+          <p:cNvSpPr>
+            <a:spLocks noGrp="1"/>
+          </p:cNvSpPr>
+          <p:nvPr>
+            <p:ph type="sldNum" sz="quarter" idx="12"/>
+          </p:nvPr>
+        </p:nvSpPr>
+        <p:spPr/>
+        <p:txBody>
+          <a:bodyPr/>
+          <a:lstStyle/>
+          <a:p>
+            <a:fld id="{C263D6C4-4840-40CC-AC84-17E24B3B7BDE}" type="slidenum">
+              <a:rPr lang="en-US" smtClean="0"/>
+              <a:pPr/>
+              <a:t>2</a:t>
+            </a:fld>
+            <a:endParaRPr lang="en-US" dirty="0"/>
+          </a:p>
+        </p:txBody>
+      </p:sp>
+      <p:pic>
+        <p:nvPicPr>
+          <p:cNvPr id="3" name="Picture 2">
+            <a:extLst>
+              <a:ext uri="{FF2B5EF4-FFF2-40B4-BE49-F238E27FC236}">
+                <a16:creationId xmlns:a16="http://schemas.microsoft.com/office/drawing/2014/main" id="{CB3A0D71-B2C0-7FCA-5FD5-EF615449D28F}"/>
+              </a:ext>
+            </a:extLst>
+          </p:cNvPr>
+          <p:cNvPicPr>
+            <a:picLocks noChangeAspect="1"/>
+          </p:cNvPicPr>
+          <p:nvPr/>
+        </p:nvPicPr>
+        <p:blipFill>
+          <a:blip r:embed="rId2"/>
+          <a:stretch>
+            <a:fillRect/>
+          </a:stretch>
+        </p:blipFill>
+        <p:spPr>
+          <a:xfrm>
+            <a:off x="4884423" y="2222935"/>
+            <a:ext cx="6367777" cy="3581875"/>
+          </a:xfrm>
+          <a:prstGeom prst="rect">
+            <a:avLst/>
+          </a:prstGeom>
+        </p:spPr>
+      </p:pic>
+    </p:spTree>
+    <p:extLst>
+      <p:ext uri="{BB962C8B-B14F-4D97-AF65-F5344CB8AC3E}">
+        <p14:creationId xmlns:p14="http://schemas.microsoft.com/office/powerpoint/2010/main" val="2902794312"/>
+      </p:ext>
+    </p:extLst>
+  </p:cSld>
+  <p:clrMapOvr>
+    <a:masterClrMapping/>
+  </p:clrMapOvr>
+  <mc:AlternateContent xmlns:mc="http://schemas.openxmlformats.org/markup-compatibility/2006" xmlns:p14="http://schemas.microsoft.com/office/powerpoint/2010/main">
+    <mc:Choice Requires="p14">
+      <p:transition spd="med" p14:dur="700">
+        <p:fade/>
+      </p:transition>
+    </mc:Choice>
+    <mc:Fallback xmlns="">
+      <p:transition spd="med">
+        <p:fade/>
+      </p:transition>
+    </mc:Fallback>
+  </mc:AlternateContent>
+</p:sld>
+</file>
+
+<file path=ppt/slides/slide20.xml><?xml version="1.0" encoding="utf-8"?>
 <p:sld xmlns:a="http://schemas.openxmlformats.org/drawingml/2006/main" xmlns:r="http://schemas.openxmlformats.org/officeDocument/2006/relationships" xmlns:p="http://schemas.openxmlformats.org/presentationml/2006/main">
   <p:cSld>
     <p:spTree>
@@ -29596,7 +31019,7 @@
             <a:fld id="{C263D6C4-4840-40CC-AC84-17E24B3B7BDE}" type="slidenum">
               <a:rPr lang="en-US" smtClean="0"/>
               <a:pPr/>
-              <a:t>15</a:t>
+              <a:t>20</a:t>
             </a:fld>
             <a:endParaRPr lang="en-US" dirty="0"/>
           </a:p>
@@ -29627,7 +31050,7 @@
 </p:sld>
 </file>
 
-<file path=ppt/slides/slide16.xml><?xml version="1.0" encoding="utf-8"?>
+<file path=ppt/slides/slide21.xml><?xml version="1.0" encoding="utf-8"?>
 <p:sld xmlns:a="http://schemas.openxmlformats.org/drawingml/2006/main" xmlns:r="http://schemas.openxmlformats.org/officeDocument/2006/relationships" xmlns:p="http://schemas.openxmlformats.org/presentationml/2006/main">
   <p:cSld>
     <p:spTree>
@@ -29686,134 +31109,6 @@
   <p:transition spd="slow">
     <p:wipe/>
   </p:transition>
-</p:sld>
-</file>
-
-<file path=ppt/slides/slide2.xml><?xml version="1.0" encoding="utf-8"?>
-<p:sld xmlns:a="http://schemas.openxmlformats.org/drawingml/2006/main" xmlns:r="http://schemas.openxmlformats.org/officeDocument/2006/relationships" xmlns:p="http://schemas.openxmlformats.org/presentationml/2006/main">
-  <p:cSld>
-    <p:spTree>
-      <p:nvGrpSpPr>
-        <p:cNvPr id="1" name=""/>
-        <p:cNvGrpSpPr/>
-        <p:nvPr/>
-      </p:nvGrpSpPr>
-      <p:grpSpPr>
-        <a:xfrm>
-          <a:off x="0" y="0"/>
-          <a:ext cx="0" cy="0"/>
-          <a:chOff x="0" y="0"/>
-          <a:chExt cx="0" cy="0"/>
-        </a:xfrm>
-      </p:grpSpPr>
-      <p:sp>
-        <p:nvSpPr>
-          <p:cNvPr id="4" name="Title 3">
-            <a:extLst>
-              <a:ext uri="{FF2B5EF4-FFF2-40B4-BE49-F238E27FC236}">
-                <a16:creationId xmlns:a16="http://schemas.microsoft.com/office/drawing/2014/main" id="{E3BD8413-C238-49D7-A4E1-E8FEF1811A0E}"/>
-              </a:ext>
-            </a:extLst>
-          </p:cNvPr>
-          <p:cNvSpPr>
-            <a:spLocks noGrp="1"/>
-          </p:cNvSpPr>
-          <p:nvPr>
-            <p:ph type="title"/>
-          </p:nvPr>
-        </p:nvSpPr>
-        <p:spPr/>
-        <p:txBody>
-          <a:bodyPr/>
-          <a:lstStyle/>
-          <a:p>
-            <a:r>
-              <a:rPr lang="en-US" dirty="0"/>
-              <a:t>Section Header01</a:t>
-            </a:r>
-          </a:p>
-        </p:txBody>
-      </p:sp>
-      <p:sp>
-        <p:nvSpPr>
-          <p:cNvPr id="5" name="Text Placeholder 4">
-            <a:extLst>
-              <a:ext uri="{FF2B5EF4-FFF2-40B4-BE49-F238E27FC236}">
-                <a16:creationId xmlns:a16="http://schemas.microsoft.com/office/drawing/2014/main" id="{0A95F4DE-39B7-4CE2-BC1E-8B8AE662A895}"/>
-              </a:ext>
-            </a:extLst>
-          </p:cNvPr>
-          <p:cNvSpPr>
-            <a:spLocks noGrp="1"/>
-          </p:cNvSpPr>
-          <p:nvPr>
-            <p:ph type="body" idx="1"/>
-          </p:nvPr>
-        </p:nvSpPr>
-        <p:spPr/>
-        <p:txBody>
-          <a:bodyPr/>
-          <a:lstStyle/>
-          <a:p>
-            <a:r>
-              <a:rPr lang="en-US" dirty="0"/>
-              <a:t>Subtitle</a:t>
-            </a:r>
-          </a:p>
-        </p:txBody>
-      </p:sp>
-      <p:sp>
-        <p:nvSpPr>
-          <p:cNvPr id="2" name="Slide Number Placeholder 1">
-            <a:extLst>
-              <a:ext uri="{FF2B5EF4-FFF2-40B4-BE49-F238E27FC236}">
-                <a16:creationId xmlns:a16="http://schemas.microsoft.com/office/drawing/2014/main" id="{0B24BF10-2B55-43AB-9F77-F1A1410384A9}"/>
-              </a:ext>
-            </a:extLst>
-          </p:cNvPr>
-          <p:cNvSpPr>
-            <a:spLocks noGrp="1"/>
-          </p:cNvSpPr>
-          <p:nvPr>
-            <p:ph type="sldNum" sz="quarter" idx="12"/>
-          </p:nvPr>
-        </p:nvSpPr>
-        <p:spPr/>
-        <p:txBody>
-          <a:bodyPr/>
-          <a:lstStyle/>
-          <a:p>
-            <a:fld id="{C263D6C4-4840-40CC-AC84-17E24B3B7BDE}" type="slidenum">
-              <a:rPr lang="en-US" smtClean="0"/>
-              <a:pPr/>
-              <a:t>2</a:t>
-            </a:fld>
-            <a:endParaRPr lang="en-US" dirty="0"/>
-          </a:p>
-        </p:txBody>
-      </p:sp>
-    </p:spTree>
-    <p:extLst>
-      <p:ext uri="{BB962C8B-B14F-4D97-AF65-F5344CB8AC3E}">
-        <p14:creationId xmlns:p14="http://schemas.microsoft.com/office/powerpoint/2010/main" val="2902794312"/>
-      </p:ext>
-    </p:extLst>
-  </p:cSld>
-  <p:clrMapOvr>
-    <a:masterClrMapping/>
-  </p:clrMapOvr>
-  <mc:AlternateContent xmlns:mc="http://schemas.openxmlformats.org/markup-compatibility/2006" xmlns:p14="http://schemas.microsoft.com/office/powerpoint/2010/main">
-    <mc:Choice Requires="p14">
-      <p:transition spd="med" p14:dur="700">
-        <p:fade/>
-      </p:transition>
-    </mc:Choice>
-    <mc:Fallback xmlns="">
-      <p:transition spd="med">
-        <p:fade/>
-      </p:transition>
-    </mc:Fallback>
-  </mc:AlternateContent>
 </p:sld>
 </file>
 
@@ -29885,20 +31180,60 @@
           <a:p>
             <a:r>
               <a:rPr lang="en-US" dirty="0"/>
-              <a:t>Lorem ipsum dolor sit amet, consectetuer adipiscing elit. Maecenas porttitor congue massa. Fusce posuere, magna sed pulvinar ultricies, purus lectus malesuada libero, sit amet commodo magna eros quis urna.</a:t>
+              <a:t>Project centered around State of the Union speeches!</a:t>
             </a:r>
           </a:p>
           <a:p>
             <a:r>
               <a:rPr lang="en-US" dirty="0"/>
-              <a:t>Nunc viverra imperdiet enim. Fusce est. Vivamus a tellus.</a:t>
+              <a:t>State of the Union speeches all the way back to George Washington!</a:t>
             </a:r>
           </a:p>
           <a:p>
+            <a:pPr lvl="1"/>
             <a:r>
               <a:rPr lang="en-US" dirty="0"/>
-              <a:t>Pellentesque habitant morbi tristique senectus et netus et malesuada fames ac turpis egestas. Proin pharetra nonummy pede. Mauris et orci.</a:t>
+              <a:t>In .txt format </a:t>
             </a:r>
+          </a:p>
+          <a:p>
+            <a:r>
+              <a:rPr lang="en-US" dirty="0"/>
+              <a:t>Utilize natural language processing techniques</a:t>
+            </a:r>
+          </a:p>
+          <a:p>
+            <a:r>
+              <a:rPr lang="en-US" dirty="0"/>
+              <a:t>Points of Curiosity</a:t>
+            </a:r>
+          </a:p>
+          <a:p>
+            <a:pPr lvl="1"/>
+            <a:r>
+              <a:rPr lang="en-US" dirty="0"/>
+              <a:t>How do the presidents speak during the State of the Union??</a:t>
+            </a:r>
+          </a:p>
+          <a:p>
+            <a:pPr lvl="1"/>
+            <a:r>
+              <a:rPr lang="en-US" dirty="0"/>
+              <a:t>What topics did each president speak about??</a:t>
+            </a:r>
+          </a:p>
+          <a:p>
+            <a:pPr lvl="1"/>
+            <a:r>
+              <a:rPr lang="en-US" dirty="0"/>
+              <a:t>More questions listed on next slide</a:t>
+            </a:r>
+          </a:p>
+          <a:p>
+            <a:endParaRPr lang="en-US" dirty="0"/>
+          </a:p>
+          <a:p>
+            <a:endParaRPr lang="en-US" dirty="0"/>
           </a:p>
         </p:txBody>
       </p:sp>
@@ -29932,6 +31267,35 @@
           </a:p>
         </p:txBody>
       </p:sp>
+      <p:pic>
+        <p:nvPicPr>
+          <p:cNvPr id="4" name="Picture 3">
+            <a:extLst>
+              <a:ext uri="{FF2B5EF4-FFF2-40B4-BE49-F238E27FC236}">
+                <a16:creationId xmlns:a16="http://schemas.microsoft.com/office/drawing/2014/main" id="{058569F4-EFEF-A2BA-F4A9-8F2C16C38551}"/>
+              </a:ext>
+            </a:extLst>
+          </p:cNvPr>
+          <p:cNvPicPr>
+            <a:picLocks noChangeAspect="1"/>
+          </p:cNvPicPr>
+          <p:nvPr/>
+        </p:nvPicPr>
+        <p:blipFill rotWithShape="1">
+          <a:blip r:embed="rId2"/>
+          <a:srcRect l="474" r="1"/>
+          <a:stretch/>
+        </p:blipFill>
+        <p:spPr>
+          <a:xfrm>
+            <a:off x="6515726" y="3384677"/>
+            <a:ext cx="4939674" cy="2333951"/>
+          </a:xfrm>
+          <a:prstGeom prst="rect">
+            <a:avLst/>
+          </a:prstGeom>
+        </p:spPr>
+      </p:pic>
     </p:spTree>
     <p:extLst>
       <p:ext uri="{BB962C8B-B14F-4D97-AF65-F5344CB8AC3E}">
@@ -30004,46 +31368,6 @@
       </p:sp>
       <p:sp>
         <p:nvSpPr>
-          <p:cNvPr id="10" name="Text Placeholder 9">
-            <a:extLst>
-              <a:ext uri="{FF2B5EF4-FFF2-40B4-BE49-F238E27FC236}">
-                <a16:creationId xmlns:a16="http://schemas.microsoft.com/office/drawing/2014/main" id="{EF2BC084-E6DB-4DE7-B309-042A85EBA700}"/>
-              </a:ext>
-            </a:extLst>
-          </p:cNvPr>
-          <p:cNvSpPr>
-            <a:spLocks noGrp="1"/>
-          </p:cNvSpPr>
-          <p:nvPr>
-            <p:ph type="body" sz="quarter" idx="13"/>
-          </p:nvPr>
-        </p:nvSpPr>
-        <p:spPr/>
-        <p:txBody>
-          <a:bodyPr/>
-          <a:lstStyle/>
-          <a:p>
-            <a:r>
-              <a:rPr lang="en-US" dirty="0"/>
-              <a:t>Lorem ipsum dolor sit amet, consectetuer adipiscing elit. Maecenas porttitor congue massa. Fusce posuere, magna sed pulvinar ultricies, purus lectus malesuada libero, sit amet commodo magna eros quis urna.</a:t>
-            </a:r>
-          </a:p>
-          <a:p>
-            <a:r>
-              <a:rPr lang="en-US" dirty="0"/>
-              <a:t>Nunc viverra imperdiet enim. Fusce est. Vivamus a tellus.</a:t>
-            </a:r>
-          </a:p>
-          <a:p>
-            <a:r>
-              <a:rPr lang="en-US" dirty="0"/>
-              <a:t>Pellentesque habitant morbi tristique senectus et netus et malesuada fames ac turpis egestas. Proin pharetra nonummy pede. Mauris et orci.</a:t>
-            </a:r>
-          </a:p>
-        </p:txBody>
-      </p:sp>
-      <p:sp>
-        <p:nvSpPr>
           <p:cNvPr id="2" name="Slide Number Placeholder 1">
             <a:extLst>
               <a:ext uri="{FF2B5EF4-FFF2-40B4-BE49-F238E27FC236}">
@@ -30068,6 +31392,371 @@
               <a:pPr/>
               <a:t>4</a:t>
             </a:fld>
+            <a:endParaRPr lang="en-US" dirty="0"/>
+          </a:p>
+        </p:txBody>
+      </p:sp>
+      <p:sp>
+        <p:nvSpPr>
+          <p:cNvPr id="4" name="Text Placeholder 3">
+            <a:extLst>
+              <a:ext uri="{FF2B5EF4-FFF2-40B4-BE49-F238E27FC236}">
+                <a16:creationId xmlns:a16="http://schemas.microsoft.com/office/drawing/2014/main" id="{6372AE50-B106-F099-BF0D-35AE9CBEA83F}"/>
+              </a:ext>
+            </a:extLst>
+          </p:cNvPr>
+          <p:cNvSpPr>
+            <a:spLocks noGrp="1"/>
+          </p:cNvSpPr>
+          <p:nvPr>
+            <p:ph type="body" sz="quarter" idx="13"/>
+          </p:nvPr>
+        </p:nvSpPr>
+        <p:spPr>
+          <a:xfrm>
+            <a:off x="6320518" y="4282514"/>
+            <a:ext cx="5735865" cy="2397686"/>
+          </a:xfrm>
+        </p:spPr>
+        <p:txBody>
+          <a:bodyPr/>
+          <a:lstStyle/>
+          <a:p>
+            <a:r>
+              <a:rPr lang="en-US" dirty="0"/>
+              <a:t>Utilized natural language processing techniques</a:t>
+            </a:r>
+          </a:p>
+          <a:p>
+            <a:pPr lvl="1"/>
+            <a:r>
+              <a:rPr lang="en-US" dirty="0"/>
+              <a:t>Filtering out symbols, punctuation</a:t>
+            </a:r>
+          </a:p>
+          <a:p>
+            <a:pPr lvl="1"/>
+            <a:r>
+              <a:rPr lang="en-US" dirty="0"/>
+              <a:t>Removing </a:t>
+            </a:r>
+            <a:r>
+              <a:rPr lang="en-US" dirty="0" err="1"/>
+              <a:t>stopwords</a:t>
+            </a:r>
+            <a:endParaRPr lang="en-US" dirty="0"/>
+          </a:p>
+          <a:p>
+            <a:pPr lvl="1"/>
+            <a:r>
+              <a:rPr lang="en-US" dirty="0"/>
+              <a:t>Removing any words with 2 characters or less</a:t>
+            </a:r>
+          </a:p>
+          <a:p>
+            <a:pPr lvl="1"/>
+            <a:r>
+              <a:rPr lang="en-US" dirty="0"/>
+              <a:t>Performed lemmatization</a:t>
+            </a:r>
+          </a:p>
+          <a:p>
+            <a:endParaRPr lang="en-US" dirty="0"/>
+          </a:p>
+        </p:txBody>
+      </p:sp>
+      <p:sp>
+        <p:nvSpPr>
+          <p:cNvPr id="5" name="Text Placeholder 3">
+            <a:extLst>
+              <a:ext uri="{FF2B5EF4-FFF2-40B4-BE49-F238E27FC236}">
+                <a16:creationId xmlns:a16="http://schemas.microsoft.com/office/drawing/2014/main" id="{1F8FB581-8EED-2E6E-25AD-207DF06A5700}"/>
+              </a:ext>
+            </a:extLst>
+          </p:cNvPr>
+          <p:cNvSpPr txBox="1">
+            <a:spLocks/>
+          </p:cNvSpPr>
+          <p:nvPr/>
+        </p:nvSpPr>
+        <p:spPr>
+          <a:xfrm>
+            <a:off x="360136" y="1560149"/>
+            <a:ext cx="7491186" cy="4093243"/>
+          </a:xfrm>
+          <a:prstGeom prst="rect">
+            <a:avLst/>
+          </a:prstGeom>
+        </p:spPr>
+        <p:txBody>
+          <a:bodyPr vert="horz" lIns="91440" tIns="45720" rIns="91440" bIns="45720" rtlCol="0">
+            <a:noAutofit/>
+          </a:bodyPr>
+          <a:lstStyle>
+            <a:lvl1pPr marL="228600" indent="-228600" algn="l" defTabSz="914400" rtl="0" eaLnBrk="1" latinLnBrk="0" hangingPunct="1">
+              <a:lnSpc>
+                <a:spcPct val="100000"/>
+              </a:lnSpc>
+              <a:spcBef>
+                <a:spcPts val="600"/>
+              </a:spcBef>
+              <a:spcAft>
+                <a:spcPts val="400"/>
+              </a:spcAft>
+              <a:buClr>
+                <a:schemeClr val="accent2"/>
+              </a:buClr>
+              <a:buFont typeface="Arial" panose="020B0604020202020204" pitchFamily="34" charset="0"/>
+              <a:buChar char="•"/>
+              <a:defRPr sz="1600" kern="1200">
+                <a:solidFill>
+                  <a:schemeClr val="bg1"/>
+                </a:solidFill>
+                <a:latin typeface="+mn-lt"/>
+                <a:ea typeface="+mn-ea"/>
+                <a:cs typeface="Arial" panose="020B0604020202020204" pitchFamily="34" charset="0"/>
+              </a:defRPr>
+            </a:lvl1pPr>
+            <a:lvl2pPr marL="685800" indent="-228600" algn="l" defTabSz="914400" rtl="0" eaLnBrk="1" latinLnBrk="0" hangingPunct="1">
+              <a:lnSpc>
+                <a:spcPct val="100000"/>
+              </a:lnSpc>
+              <a:spcBef>
+                <a:spcPts val="600"/>
+              </a:spcBef>
+              <a:spcAft>
+                <a:spcPts val="400"/>
+              </a:spcAft>
+              <a:buClr>
+                <a:schemeClr val="accent2"/>
+              </a:buClr>
+              <a:buFont typeface="Arial" panose="020B0604020202020204" pitchFamily="34" charset="0"/>
+              <a:buChar char="•"/>
+              <a:defRPr sz="1400" kern="1200">
+                <a:solidFill>
+                  <a:schemeClr val="bg1"/>
+                </a:solidFill>
+                <a:latin typeface="+mn-lt"/>
+                <a:ea typeface="+mn-ea"/>
+                <a:cs typeface="Arial" panose="020B0604020202020204" pitchFamily="34" charset="0"/>
+              </a:defRPr>
+            </a:lvl2pPr>
+            <a:lvl3pPr marL="1143000" indent="-228600" algn="l" defTabSz="914400" rtl="0" eaLnBrk="1" latinLnBrk="0" hangingPunct="1">
+              <a:lnSpc>
+                <a:spcPct val="100000"/>
+              </a:lnSpc>
+              <a:spcBef>
+                <a:spcPts val="600"/>
+              </a:spcBef>
+              <a:spcAft>
+                <a:spcPts val="400"/>
+              </a:spcAft>
+              <a:buClr>
+                <a:schemeClr val="accent2"/>
+              </a:buClr>
+              <a:buFont typeface="Arial" panose="020B0604020202020204" pitchFamily="34" charset="0"/>
+              <a:buChar char="•"/>
+              <a:defRPr sz="1200" kern="1200">
+                <a:solidFill>
+                  <a:schemeClr val="bg1"/>
+                </a:solidFill>
+                <a:latin typeface="+mn-lt"/>
+                <a:ea typeface="+mn-ea"/>
+                <a:cs typeface="Arial" panose="020B0604020202020204" pitchFamily="34" charset="0"/>
+              </a:defRPr>
+            </a:lvl3pPr>
+            <a:lvl4pPr marL="1600200" indent="-228600" algn="l" defTabSz="914400" rtl="0" eaLnBrk="1" latinLnBrk="0" hangingPunct="1">
+              <a:lnSpc>
+                <a:spcPct val="90000"/>
+              </a:lnSpc>
+              <a:spcBef>
+                <a:spcPts val="500"/>
+              </a:spcBef>
+              <a:buClr>
+                <a:schemeClr val="accent2"/>
+              </a:buClr>
+              <a:buFont typeface="Arial" panose="020B0604020202020204" pitchFamily="34" charset="0"/>
+              <a:buChar char="•"/>
+              <a:defRPr sz="1400" kern="1200">
+                <a:solidFill>
+                  <a:schemeClr val="bg1"/>
+                </a:solidFill>
+                <a:latin typeface="Arial" panose="020B0604020202020204" pitchFamily="34" charset="0"/>
+                <a:ea typeface="+mn-ea"/>
+                <a:cs typeface="Arial" panose="020B0604020202020204" pitchFamily="34" charset="0"/>
+              </a:defRPr>
+            </a:lvl4pPr>
+            <a:lvl5pPr marL="2057400" indent="-228600" algn="l" defTabSz="914400" rtl="0" eaLnBrk="1" latinLnBrk="0" hangingPunct="1">
+              <a:lnSpc>
+                <a:spcPct val="90000"/>
+              </a:lnSpc>
+              <a:spcBef>
+                <a:spcPts val="500"/>
+              </a:spcBef>
+              <a:buClr>
+                <a:schemeClr val="accent2"/>
+              </a:buClr>
+              <a:buFont typeface="Arial" panose="020B0604020202020204" pitchFamily="34" charset="0"/>
+              <a:buChar char="•"/>
+              <a:defRPr sz="1400" kern="1200">
+                <a:solidFill>
+                  <a:schemeClr val="bg1"/>
+                </a:solidFill>
+                <a:latin typeface="Arial" panose="020B0604020202020204" pitchFamily="34" charset="0"/>
+                <a:ea typeface="+mn-ea"/>
+                <a:cs typeface="Arial" panose="020B0604020202020204" pitchFamily="34" charset="0"/>
+              </a:defRPr>
+            </a:lvl5pPr>
+            <a:lvl6pPr marL="2514600" indent="-228600" algn="l" defTabSz="914400" rtl="0" eaLnBrk="1" latinLnBrk="0" hangingPunct="1">
+              <a:lnSpc>
+                <a:spcPct val="90000"/>
+              </a:lnSpc>
+              <a:spcBef>
+                <a:spcPts val="500"/>
+              </a:spcBef>
+              <a:buFont typeface="Arial" panose="020B0604020202020204" pitchFamily="34" charset="0"/>
+              <a:buChar char="•"/>
+              <a:defRPr sz="1800" kern="1200">
+                <a:solidFill>
+                  <a:schemeClr val="tx1"/>
+                </a:solidFill>
+                <a:latin typeface="+mn-lt"/>
+                <a:ea typeface="+mn-ea"/>
+                <a:cs typeface="+mn-cs"/>
+              </a:defRPr>
+            </a:lvl6pPr>
+            <a:lvl7pPr marL="2971800" indent="-228600" algn="l" defTabSz="914400" rtl="0" eaLnBrk="1" latinLnBrk="0" hangingPunct="1">
+              <a:lnSpc>
+                <a:spcPct val="90000"/>
+              </a:lnSpc>
+              <a:spcBef>
+                <a:spcPts val="500"/>
+              </a:spcBef>
+              <a:buFont typeface="Arial" panose="020B0604020202020204" pitchFamily="34" charset="0"/>
+              <a:buChar char="•"/>
+              <a:defRPr sz="1800" kern="1200">
+                <a:solidFill>
+                  <a:schemeClr val="tx1"/>
+                </a:solidFill>
+                <a:latin typeface="+mn-lt"/>
+                <a:ea typeface="+mn-ea"/>
+                <a:cs typeface="+mn-cs"/>
+              </a:defRPr>
+            </a:lvl7pPr>
+            <a:lvl8pPr marL="3429000" indent="-228600" algn="l" defTabSz="914400" rtl="0" eaLnBrk="1" latinLnBrk="0" hangingPunct="1">
+              <a:lnSpc>
+                <a:spcPct val="90000"/>
+              </a:lnSpc>
+              <a:spcBef>
+                <a:spcPts val="500"/>
+              </a:spcBef>
+              <a:buFont typeface="Arial" panose="020B0604020202020204" pitchFamily="34" charset="0"/>
+              <a:buChar char="•"/>
+              <a:defRPr sz="1800" kern="1200">
+                <a:solidFill>
+                  <a:schemeClr val="tx1"/>
+                </a:solidFill>
+                <a:latin typeface="+mn-lt"/>
+                <a:ea typeface="+mn-ea"/>
+                <a:cs typeface="+mn-cs"/>
+              </a:defRPr>
+            </a:lvl8pPr>
+            <a:lvl9pPr marL="3886200" indent="-228600" algn="l" defTabSz="914400" rtl="0" eaLnBrk="1" latinLnBrk="0" hangingPunct="1">
+              <a:lnSpc>
+                <a:spcPct val="90000"/>
+              </a:lnSpc>
+              <a:spcBef>
+                <a:spcPts val="500"/>
+              </a:spcBef>
+              <a:buFont typeface="Arial" panose="020B0604020202020204" pitchFamily="34" charset="0"/>
+              <a:buChar char="•"/>
+              <a:defRPr sz="1800" kern="1200">
+                <a:solidFill>
+                  <a:schemeClr val="tx1"/>
+                </a:solidFill>
+                <a:latin typeface="+mn-lt"/>
+                <a:ea typeface="+mn-ea"/>
+                <a:cs typeface="+mn-cs"/>
+              </a:defRPr>
+            </a:lvl9pPr>
+          </a:lstStyle>
+          <a:p>
+            <a:r>
+              <a:rPr lang="en-US" dirty="0"/>
+              <a:t>Goals: </a:t>
+            </a:r>
+          </a:p>
+          <a:p>
+            <a:pPr lvl="1"/>
+            <a:r>
+              <a:rPr lang="en-US" dirty="0"/>
+              <a:t>Had list of questions to answer</a:t>
+            </a:r>
+          </a:p>
+          <a:p>
+            <a:pPr lvl="2"/>
+            <a:r>
+              <a:rPr lang="en-US" dirty="0"/>
+              <a:t>What is the quantitative positive/negative sentiment between all the speeches?</a:t>
+            </a:r>
+          </a:p>
+          <a:p>
+            <a:pPr lvl="2"/>
+            <a:r>
+              <a:rPr lang="en-US" dirty="0"/>
+              <a:t>Which presidents use the widest variety of words?</a:t>
+            </a:r>
+          </a:p>
+          <a:p>
+            <a:pPr lvl="2"/>
+            <a:r>
+              <a:rPr lang="en-US" dirty="0"/>
+              <a:t>What is the quantitative positive/negative sentiment between all the presidents?</a:t>
+            </a:r>
+          </a:p>
+          <a:p>
+            <a:pPr lvl="2"/>
+            <a:r>
+              <a:rPr lang="en-US" dirty="0"/>
+              <a:t>What are the themes or buzzwords among the different speeches / presidents?</a:t>
+            </a:r>
+          </a:p>
+          <a:p>
+            <a:pPr lvl="2"/>
+            <a:r>
+              <a:rPr lang="en-US" dirty="0"/>
+              <a:t>What were the most common words used in each speech?</a:t>
+            </a:r>
+          </a:p>
+          <a:p>
+            <a:pPr lvl="2"/>
+            <a:r>
+              <a:rPr lang="en-US" dirty="0"/>
+              <a:t>Which presidents gave the longest speeches?</a:t>
+            </a:r>
+          </a:p>
+          <a:p>
+            <a:pPr lvl="2"/>
+            <a:r>
+              <a:rPr lang="en-US" dirty="0"/>
+              <a:t>Which presidents gave the shortest speeches?</a:t>
+            </a:r>
+          </a:p>
+          <a:p>
+            <a:pPr lvl="2"/>
+            <a:r>
+              <a:rPr lang="en-US" dirty="0"/>
+              <a:t>Which presidents used the most unique words?</a:t>
+            </a:r>
+          </a:p>
+          <a:p>
+            <a:pPr lvl="2"/>
+            <a:r>
+              <a:rPr lang="en-US" dirty="0"/>
+              <a:t>Which presidents used the least unique words?</a:t>
+            </a:r>
+          </a:p>
+          <a:p>
             <a:endParaRPr lang="en-US" dirty="0"/>
           </a:p>
         </p:txBody>
@@ -30158,27 +31847,74 @@
             <p:ph type="body" sz="quarter" idx="13"/>
           </p:nvPr>
         </p:nvSpPr>
-        <p:spPr/>
+        <p:spPr>
+          <a:xfrm>
+            <a:off x="58420" y="1290105"/>
+            <a:ext cx="4401820" cy="4093243"/>
+          </a:xfrm>
+        </p:spPr>
         <p:txBody>
           <a:bodyPr/>
           <a:lstStyle/>
           <a:p>
             <a:r>
               <a:rPr lang="en-US" dirty="0"/>
-              <a:t>Lorem ipsum dolor sit amet, consectetuer adipiscing elit. Maecenas porttitor congue massa. Fusce posuere, magna sed pulvinar ultricies, purus lectus malesuada libero, sit amet commodo magna eros quis urna.</a:t>
+              <a:t>What is the quantitative positive/negative sentiment between all the speeches?</a:t>
             </a:r>
           </a:p>
           <a:p>
+            <a:pPr lvl="1"/>
             <a:r>
               <a:rPr lang="en-US" dirty="0"/>
-              <a:t>Nunc viverra imperdiet enim. Fusce est. Vivamus a tellus.</a:t>
+              <a:t>Generally positive polarity!</a:t>
             </a:r>
           </a:p>
           <a:p>
+            <a:pPr lvl="1"/>
             <a:r>
               <a:rPr lang="en-US" dirty="0"/>
-              <a:t>Pellentesque habitant morbi tristique senectus et netus et malesuada fames ac turpis egestas. Proin pharetra nonummy pede. Mauris et orci.</a:t>
+              <a:t>Messy chart on right, but shows an uptick in polarity after WWII</a:t>
             </a:r>
+          </a:p>
+          <a:p>
+            <a:pPr lvl="1"/>
+            <a:r>
+              <a:rPr lang="en-US" dirty="0"/>
+              <a:t>Seems to be on a downward trend at-present</a:t>
+            </a:r>
+          </a:p>
+          <a:p>
+            <a:r>
+              <a:rPr lang="en-US" dirty="0"/>
+              <a:t>What is the quantitative positive/negative sentiment between all the presidents?</a:t>
+            </a:r>
+          </a:p>
+          <a:p>
+            <a:pPr lvl="1"/>
+            <a:r>
+              <a:rPr lang="en-US" dirty="0"/>
+              <a:t>Nixon, Eisenhower, Reagan, Monroe all positive</a:t>
+            </a:r>
+          </a:p>
+          <a:p>
+            <a:pPr lvl="1"/>
+            <a:r>
+              <a:rPr lang="en-US" dirty="0"/>
+              <a:t>Buchanan, Cleveland, Pierce, Obama more negative</a:t>
+            </a:r>
+          </a:p>
+          <a:p>
+            <a:pPr lvl="1"/>
+            <a:r>
+              <a:rPr lang="en-US" dirty="0"/>
+              <a:t>Recent Republicans seem to be more positive than recent Democrats</a:t>
+            </a:r>
+          </a:p>
+          <a:p>
+            <a:endParaRPr lang="en-US" dirty="0"/>
+          </a:p>
+          <a:p>
+            <a:endParaRPr lang="en-US" dirty="0"/>
           </a:p>
         </p:txBody>
       </p:sp>
@@ -30212,6 +31948,66 @@
           </a:p>
         </p:txBody>
       </p:sp>
+      <p:pic>
+        <p:nvPicPr>
+          <p:cNvPr id="4" name="Picture 3" descr="A graph with blue lines&#10;&#10;Description automatically generated">
+            <a:extLst>
+              <a:ext uri="{FF2B5EF4-FFF2-40B4-BE49-F238E27FC236}">
+                <a16:creationId xmlns:a16="http://schemas.microsoft.com/office/drawing/2014/main" id="{F0E27162-68C4-B8A5-8DB8-4918EE9A45B6}"/>
+              </a:ext>
+            </a:extLst>
+          </p:cNvPr>
+          <p:cNvPicPr>
+            <a:picLocks noChangeAspect="1"/>
+          </p:cNvPicPr>
+          <p:nvPr/>
+        </p:nvPicPr>
+        <p:blipFill>
+          <a:blip r:embed="rId2"/>
+          <a:stretch>
+            <a:fillRect/>
+          </a:stretch>
+        </p:blipFill>
+        <p:spPr>
+          <a:xfrm>
+            <a:off x="8191068" y="2240484"/>
+            <a:ext cx="3952671" cy="3952671"/>
+          </a:xfrm>
+          <a:prstGeom prst="rect">
+            <a:avLst/>
+          </a:prstGeom>
+        </p:spPr>
+      </p:pic>
+      <p:pic>
+        <p:nvPicPr>
+          <p:cNvPr id="6" name="Picture 5" descr="A graph with a line&#10;&#10;Description automatically generated">
+            <a:extLst>
+              <a:ext uri="{FF2B5EF4-FFF2-40B4-BE49-F238E27FC236}">
+                <a16:creationId xmlns:a16="http://schemas.microsoft.com/office/drawing/2014/main" id="{933AE526-D5C3-3A60-72F1-BCF3DC252DBC}"/>
+              </a:ext>
+            </a:extLst>
+          </p:cNvPr>
+          <p:cNvPicPr>
+            <a:picLocks noChangeAspect="1"/>
+          </p:cNvPicPr>
+          <p:nvPr/>
+        </p:nvPicPr>
+        <p:blipFill>
+          <a:blip r:embed="rId3"/>
+          <a:stretch>
+            <a:fillRect/>
+          </a:stretch>
+        </p:blipFill>
+        <p:spPr>
+          <a:xfrm>
+            <a:off x="4303294" y="2240484"/>
+            <a:ext cx="3952671" cy="3952671"/>
+          </a:xfrm>
+          <a:prstGeom prst="rect">
+            <a:avLst/>
+          </a:prstGeom>
+        </p:spPr>
+      </p:pic>
     </p:spTree>
     <p:extLst>
       <p:ext uri="{BB962C8B-B14F-4D97-AF65-F5344CB8AC3E}">
@@ -30222,13 +32018,13 @@
   <p:clrMapOvr>
     <a:masterClrMapping/>
   </p:clrMapOvr>
-  <mc:AlternateContent xmlns:mc="http://schemas.openxmlformats.org/markup-compatibility/2006">
-    <mc:Choice xmlns:p14="http://schemas.microsoft.com/office/powerpoint/2010/main" Requires="p14">
+  <mc:AlternateContent xmlns:mc="http://schemas.openxmlformats.org/markup-compatibility/2006" xmlns:p14="http://schemas.microsoft.com/office/powerpoint/2010/main">
+    <mc:Choice Requires="p14">
       <p:transition spd="med" p14:dur="700">
         <p:fade/>
       </p:transition>
     </mc:Choice>
-    <mc:Fallback>
+    <mc:Fallback xmlns="">
       <p:transition spd="med">
         <p:fade/>
       </p:transition>
@@ -30277,7 +32073,7 @@
           <a:p>
             <a:r>
               <a:rPr lang="en-US" dirty="0"/>
-              <a:t>Conclusion</a:t>
+              <a:t>Results </a:t>
             </a:r>
           </a:p>
         </p:txBody>
@@ -30305,20 +32101,26 @@
           <a:p>
             <a:r>
               <a:rPr lang="en-US" dirty="0"/>
-              <a:t>Lorem ipsum dolor sit amet, consectetuer adipiscing elit. Maecenas porttitor congue massa. Fusce posuere, magna sed pulvinar ultricies, purus lectus malesuada libero, sit amet commodo magna eros quis urna.</a:t>
+              <a:t>Which presidents use the widest variety of words?</a:t>
             </a:r>
           </a:p>
           <a:p>
             <a:r>
               <a:rPr lang="en-US" dirty="0"/>
-              <a:t>Nunc viverra imperdiet enim. Fusce est. Vivamus a tellus.</a:t>
+              <a:t>Which presidents used the most unique words?</a:t>
             </a:r>
           </a:p>
           <a:p>
             <a:r>
               <a:rPr lang="en-US" dirty="0"/>
-              <a:t>Pellentesque habitant morbi tristique senectus et netus et malesuada fames ac turpis egestas. Proin pharetra nonummy pede. Mauris et orci.</a:t>
+              <a:t>Which presidents used the least unique words?</a:t>
             </a:r>
+          </a:p>
+          <a:p>
+            <a:endParaRPr lang="en-US" dirty="0"/>
+          </a:p>
+          <a:p>
+            <a:endParaRPr lang="en-US" dirty="0"/>
           </a:p>
         </p:txBody>
       </p:sp>
@@ -30355,7 +32157,7 @@
     </p:spTree>
     <p:extLst>
       <p:ext uri="{BB962C8B-B14F-4D97-AF65-F5344CB8AC3E}">
-        <p14:creationId xmlns:p14="http://schemas.microsoft.com/office/powerpoint/2010/main" val="4063189269"/>
+        <p14:creationId xmlns:p14="http://schemas.microsoft.com/office/powerpoint/2010/main" val="4233543114"/>
       </p:ext>
     </p:extLst>
   </p:cSld>
@@ -30417,7 +32219,7 @@
           <a:p>
             <a:r>
               <a:rPr lang="en-US" dirty="0"/>
-              <a:t>Future Work</a:t>
+              <a:t>Results </a:t>
             </a:r>
           </a:p>
         </p:txBody>
@@ -30445,20 +32247,20 @@
           <a:p>
             <a:r>
               <a:rPr lang="en-US" dirty="0"/>
-              <a:t>Lorem ipsum dolor sit amet, consectetuer adipiscing elit. Maecenas porttitor congue massa. Fusce posuere, magna sed pulvinar ultricies, purus lectus malesuada libero, sit amet commodo magna eros quis urna.</a:t>
+              <a:t>What are the themes or buzzwords among the different speeches / presidents?</a:t>
             </a:r>
           </a:p>
           <a:p>
             <a:r>
               <a:rPr lang="en-US" dirty="0"/>
-              <a:t>Nunc viverra imperdiet enim. Fusce est. Vivamus a tellus.</a:t>
+              <a:t>What were the most common words used in each speech?</a:t>
             </a:r>
           </a:p>
           <a:p>
-            <a:r>
-              <a:rPr lang="en-US" dirty="0"/>
-              <a:t>Pellentesque habitant morbi tristique senectus et netus et malesuada fames ac turpis egestas. Proin pharetra nonummy pede. Mauris et orci.</a:t>
-            </a:r>
+            <a:endParaRPr lang="en-US" dirty="0"/>
+          </a:p>
+          <a:p>
+            <a:endParaRPr lang="en-US" dirty="0"/>
           </a:p>
         </p:txBody>
       </p:sp>
@@ -30495,7 +32297,7 @@
     </p:spTree>
     <p:extLst>
       <p:ext uri="{BB962C8B-B14F-4D97-AF65-F5344CB8AC3E}">
-        <p14:creationId xmlns:p14="http://schemas.microsoft.com/office/powerpoint/2010/main" val="1684049125"/>
+        <p14:creationId xmlns:p14="http://schemas.microsoft.com/office/powerpoint/2010/main" val="1328684943"/>
       </p:ext>
     </p:extLst>
   </p:cSld>
@@ -30557,7 +32359,7 @@
           <a:p>
             <a:r>
               <a:rPr lang="en-US" dirty="0"/>
-              <a:t>References</a:t>
+              <a:t>Results </a:t>
             </a:r>
           </a:p>
         </p:txBody>
@@ -30585,20 +32387,20 @@
           <a:p>
             <a:r>
               <a:rPr lang="en-US" dirty="0"/>
-              <a:t>Lorem ipsum dolor sit amet, consectetuer adipiscing elit. Maecenas porttitor congue massa. Fusce posuere, magna sed pulvinar ultricies, purus lectus malesuada libero, sit amet commodo magna eros quis urna.</a:t>
+              <a:t>Which presidents gave the longest speeches?</a:t>
             </a:r>
           </a:p>
           <a:p>
             <a:r>
               <a:rPr lang="en-US" dirty="0"/>
-              <a:t>Nunc viverra imperdiet enim. Fusce est. Vivamus a tellus.</a:t>
+              <a:t>Which presidents gave the shortest speeches?</a:t>
             </a:r>
           </a:p>
           <a:p>
-            <a:r>
-              <a:rPr lang="en-US" dirty="0"/>
-              <a:t>Pellentesque habitant morbi tristique senectus et netus et malesuada fames ac turpis egestas. Proin pharetra nonummy pede. Mauris et orci.</a:t>
-            </a:r>
+            <a:endParaRPr lang="en-US" dirty="0"/>
+          </a:p>
+          <a:p>
+            <a:endParaRPr lang="en-US" dirty="0"/>
           </a:p>
         </p:txBody>
       </p:sp>
@@ -30635,7 +32437,7 @@
     </p:spTree>
     <p:extLst>
       <p:ext uri="{BB962C8B-B14F-4D97-AF65-F5344CB8AC3E}">
-        <p14:creationId xmlns:p14="http://schemas.microsoft.com/office/powerpoint/2010/main" val="1970689994"/>
+        <p14:creationId xmlns:p14="http://schemas.microsoft.com/office/powerpoint/2010/main" val="1790751634"/>
       </p:ext>
     </p:extLst>
   </p:cSld>
@@ -30676,10 +32478,10 @@
       </p:grpSpPr>
       <p:sp>
         <p:nvSpPr>
-          <p:cNvPr id="4" name="Title 3">
+          <p:cNvPr id="7" name="Title 6">
             <a:extLst>
               <a:ext uri="{FF2B5EF4-FFF2-40B4-BE49-F238E27FC236}">
-                <a16:creationId xmlns:a16="http://schemas.microsoft.com/office/drawing/2014/main" id="{315E3981-F0D7-482C-A8E0-6A57700BECA7}"/>
+                <a16:creationId xmlns:a16="http://schemas.microsoft.com/office/drawing/2014/main" id="{7875C19A-1AAE-476A-A316-A2CF92D763D3}"/>
               </a:ext>
             </a:extLst>
           </p:cNvPr>
@@ -30697,8 +32499,90 @@
           <a:p>
             <a:r>
               <a:rPr lang="en-US" dirty="0"/>
-              <a:t>Content Title 02</a:t>
+              <a:t>Results </a:t>
             </a:r>
+          </a:p>
+        </p:txBody>
+      </p:sp>
+      <p:sp>
+        <p:nvSpPr>
+          <p:cNvPr id="10" name="Text Placeholder 9">
+            <a:extLst>
+              <a:ext uri="{FF2B5EF4-FFF2-40B4-BE49-F238E27FC236}">
+                <a16:creationId xmlns:a16="http://schemas.microsoft.com/office/drawing/2014/main" id="{EF2BC084-E6DB-4DE7-B309-042A85EBA700}"/>
+              </a:ext>
+            </a:extLst>
+          </p:cNvPr>
+          <p:cNvSpPr>
+            <a:spLocks noGrp="1"/>
+          </p:cNvSpPr>
+          <p:nvPr>
+            <p:ph type="body" sz="quarter" idx="13"/>
+          </p:nvPr>
+        </p:nvSpPr>
+        <p:spPr/>
+        <p:txBody>
+          <a:bodyPr/>
+          <a:lstStyle/>
+          <a:p>
+            <a:r>
+              <a:rPr lang="en-US" dirty="0"/>
+              <a:t>What is the quantitative positive/negative sentiment between all the speeches?</a:t>
+            </a:r>
+          </a:p>
+          <a:p>
+            <a:r>
+              <a:rPr lang="en-US" dirty="0"/>
+              <a:t>Which presidents use the widest variety of words?</a:t>
+            </a:r>
+          </a:p>
+          <a:p>
+            <a:r>
+              <a:rPr lang="en-US" dirty="0"/>
+              <a:t>What is the quantitative positive/negative sentiment between all the presidents?</a:t>
+            </a:r>
+          </a:p>
+          <a:p>
+            <a:r>
+              <a:rPr lang="en-US" dirty="0"/>
+              <a:t>What are the themes or buzzwords among the different speeches / presidents?</a:t>
+            </a:r>
+          </a:p>
+          <a:p>
+            <a:r>
+              <a:rPr lang="en-US" dirty="0"/>
+              <a:t>What were the most common words used in each speech?</a:t>
+            </a:r>
+          </a:p>
+          <a:p>
+            <a:r>
+              <a:rPr lang="en-US" dirty="0"/>
+              <a:t>Which presidents gave the longest speeches?</a:t>
+            </a:r>
+          </a:p>
+          <a:p>
+            <a:r>
+              <a:rPr lang="en-US" dirty="0"/>
+              <a:t>Which presidents gave the shortest speeches?</a:t>
+            </a:r>
+          </a:p>
+          <a:p>
+            <a:r>
+              <a:rPr lang="en-US" dirty="0"/>
+              <a:t>Which presidents used the most unique words?</a:t>
+            </a:r>
+          </a:p>
+          <a:p>
+            <a:r>
+              <a:rPr lang="en-US" dirty="0"/>
+              <a:t>Which presidents used the least unique words?</a:t>
+            </a:r>
+          </a:p>
+          <a:p>
+            <a:endParaRPr lang="en-US" dirty="0"/>
+          </a:p>
+          <a:p>
+            <a:endParaRPr lang="en-US" dirty="0"/>
           </a:p>
         </p:txBody>
       </p:sp>
@@ -30707,7 +32591,7 @@
           <p:cNvPr id="2" name="Slide Number Placeholder 1">
             <a:extLst>
               <a:ext uri="{FF2B5EF4-FFF2-40B4-BE49-F238E27FC236}">
-                <a16:creationId xmlns:a16="http://schemas.microsoft.com/office/drawing/2014/main" id="{520FC4EE-F318-4344-9E3C-B950ADB63865}"/>
+                <a16:creationId xmlns:a16="http://schemas.microsoft.com/office/drawing/2014/main" id="{BE9800F6-D571-48C4-8466-12AA1ADB6599}"/>
               </a:ext>
             </a:extLst>
           </p:cNvPr>
@@ -30732,156 +32616,23 @@
           </a:p>
         </p:txBody>
       </p:sp>
-      <p:sp>
-        <p:nvSpPr>
-          <p:cNvPr id="7" name="Text Placeholder 6">
-            <a:extLst>
-              <a:ext uri="{FF2B5EF4-FFF2-40B4-BE49-F238E27FC236}">
-                <a16:creationId xmlns:a16="http://schemas.microsoft.com/office/drawing/2014/main" id="{B74126B4-1E6C-4FFF-9282-40E18A85A07F}"/>
-              </a:ext>
-            </a:extLst>
-          </p:cNvPr>
-          <p:cNvSpPr>
-            <a:spLocks noGrp="1"/>
-          </p:cNvSpPr>
-          <p:nvPr>
-            <p:ph type="body" sz="quarter" idx="1"/>
-          </p:nvPr>
-        </p:nvSpPr>
-        <p:spPr/>
-        <p:txBody>
-          <a:bodyPr/>
-          <a:lstStyle/>
-          <a:p>
-            <a:r>
-              <a:rPr lang="en-US" dirty="0"/>
-              <a:t>Lorem ipsum dolor sit amet</a:t>
-            </a:r>
-          </a:p>
-        </p:txBody>
-      </p:sp>
-      <p:sp>
-        <p:nvSpPr>
-          <p:cNvPr id="5" name="Text Placeholder 4">
-            <a:extLst>
-              <a:ext uri="{FF2B5EF4-FFF2-40B4-BE49-F238E27FC236}">
-                <a16:creationId xmlns:a16="http://schemas.microsoft.com/office/drawing/2014/main" id="{E0C87788-476B-4620-8002-A5C1177AD6C1}"/>
-              </a:ext>
-            </a:extLst>
-          </p:cNvPr>
-          <p:cNvSpPr>
-            <a:spLocks noGrp="1"/>
-          </p:cNvSpPr>
-          <p:nvPr>
-            <p:ph type="body" sz="quarter" idx="3"/>
-          </p:nvPr>
-        </p:nvSpPr>
-        <p:spPr/>
-        <p:txBody>
-          <a:bodyPr/>
-          <a:lstStyle/>
-          <a:p>
-            <a:r>
-              <a:rPr lang="en-US" dirty="0"/>
-              <a:t>Lorem ipsum dolor sit amet</a:t>
-            </a:r>
-          </a:p>
-        </p:txBody>
-      </p:sp>
-      <p:sp>
-        <p:nvSpPr>
-          <p:cNvPr id="8" name="Text Placeholder 7">
-            <a:extLst>
-              <a:ext uri="{FF2B5EF4-FFF2-40B4-BE49-F238E27FC236}">
-                <a16:creationId xmlns:a16="http://schemas.microsoft.com/office/drawing/2014/main" id="{47DC4E62-1A34-4F98-A451-214F1808519C}"/>
-              </a:ext>
-            </a:extLst>
-          </p:cNvPr>
-          <p:cNvSpPr>
-            <a:spLocks noGrp="1"/>
-          </p:cNvSpPr>
-          <p:nvPr>
-            <p:ph type="body" sz="quarter" idx="2"/>
-          </p:nvPr>
-        </p:nvSpPr>
-        <p:spPr/>
-        <p:txBody>
-          <a:bodyPr/>
-          <a:lstStyle/>
-          <a:p>
-            <a:r>
-              <a:rPr lang="en-US" dirty="0"/>
-              <a:t>Lorem ipsum dolor sit amet, consectetuer adipiscing elit. Maecenas porttitor congue massa. Fusce posuere, magna sed pulvinar ultricies, purus lectus malesuada libero, sit amet commodo magna eros quis urna. Nunc viverra imperdiet enim. Fusce est. Vivamus a tellus.</a:t>
-            </a:r>
-          </a:p>
-          <a:p>
-            <a:r>
-              <a:rPr lang="en-US" dirty="0"/>
-              <a:t>Pellentesque habitant morbi tristique senectus et netus et malesuada fames ac turpis egestas. Proin pharetra nonummy pede. Mauris et orci.</a:t>
-            </a:r>
-          </a:p>
-          <a:p>
-            <a:endParaRPr lang="en-US" dirty="0"/>
-          </a:p>
-          <a:p>
-            <a:endParaRPr lang="en-US" dirty="0"/>
-          </a:p>
-        </p:txBody>
-      </p:sp>
-      <p:sp>
-        <p:nvSpPr>
-          <p:cNvPr id="6" name="Text Placeholder 5">
-            <a:extLst>
-              <a:ext uri="{FF2B5EF4-FFF2-40B4-BE49-F238E27FC236}">
-                <a16:creationId xmlns:a16="http://schemas.microsoft.com/office/drawing/2014/main" id="{000A9570-5EF6-4AFB-9FCA-7C8998E3FEB1}"/>
-              </a:ext>
-            </a:extLst>
-          </p:cNvPr>
-          <p:cNvSpPr>
-            <a:spLocks noGrp="1"/>
-          </p:cNvSpPr>
-          <p:nvPr>
-            <p:ph type="body" sz="quarter" idx="4"/>
-          </p:nvPr>
-        </p:nvSpPr>
-        <p:spPr/>
-        <p:txBody>
-          <a:bodyPr/>
-          <a:lstStyle/>
-          <a:p>
-            <a:r>
-              <a:rPr lang="en-US" dirty="0"/>
-              <a:t>Lorem ipsum dolor sit amet, consectetuer adipiscing elit. Maecenas porttitor congue massa. Fusce posuere, magna sed pulvinar ultricies, purus lectus malesuada libero, sit amet commodo magna eros quis urna. Nunc viverra imperdiet enim. Fusce est. Vivamus a tellus.</a:t>
-            </a:r>
-          </a:p>
-          <a:p>
-            <a:r>
-              <a:rPr lang="en-US" dirty="0"/>
-              <a:t>Pellentesque habitant morbi tristique senectus et netus et malesuada fames ac turpis egestas. Proin pharetra nonummy pede. Mauris et orci.</a:t>
-            </a:r>
-          </a:p>
-          <a:p>
-            <a:endParaRPr lang="en-US" dirty="0"/>
-          </a:p>
-        </p:txBody>
-      </p:sp>
     </p:spTree>
     <p:extLst>
       <p:ext uri="{BB962C8B-B14F-4D97-AF65-F5344CB8AC3E}">
-        <p14:creationId xmlns:p14="http://schemas.microsoft.com/office/powerpoint/2010/main" val="3607270498"/>
+        <p14:creationId xmlns:p14="http://schemas.microsoft.com/office/powerpoint/2010/main" val="387932245"/>
       </p:ext>
     </p:extLst>
   </p:cSld>
   <p:clrMapOvr>
     <a:masterClrMapping/>
   </p:clrMapOvr>
-  <mc:AlternateContent xmlns:mc="http://schemas.openxmlformats.org/markup-compatibility/2006" xmlns:p14="http://schemas.microsoft.com/office/powerpoint/2010/main">
-    <mc:Choice Requires="p14">
+  <mc:AlternateContent xmlns:mc="http://schemas.openxmlformats.org/markup-compatibility/2006">
+    <mc:Choice xmlns:p14="http://schemas.microsoft.com/office/powerpoint/2010/main" Requires="p14">
       <p:transition spd="med" p14:dur="700">
         <p:fade/>
       </p:transition>
     </mc:Choice>
-    <mc:Fallback xmlns="">
+    <mc:Fallback>
       <p:transition spd="med">
         <p:fade/>
       </p:transition>
@@ -31690,15 +33441,6 @@
 </file>
 
 <file path=customXml/item2.xml><?xml version="1.0" encoding="utf-8"?>
-<?mso-contentType ?>
-<FormTemplates xmlns="http://schemas.microsoft.com/sharepoint/v3/contenttype/forms">
-  <Display>DocumentLibraryForm</Display>
-  <Edit>DocumentLibraryForm</Edit>
-  <New>DocumentLibraryForm</New>
-</FormTemplates>
-</file>
-
-<file path=customXml/item3.xml><?xml version="1.0" encoding="utf-8"?>
 <ct:contentTypeSchema xmlns:ct="http://schemas.microsoft.com/office/2006/metadata/contentType" xmlns:ma="http://schemas.microsoft.com/office/2006/metadata/properties/metaAttributes" ct:_="" ma:_="" ma:contentTypeName="Document" ma:contentTypeID="0x01010079F111ED35F8CC479449609E8A0923A6" ma:contentTypeVersion="11" ma:contentTypeDescription="Create a new document." ma:contentTypeScope="" ma:versionID="96291512c1ee715ab617f4c07df79fc1">
   <xsd:schema xmlns:xsd="http://www.w3.org/2001/XMLSchema" xmlns:xs="http://www.w3.org/2001/XMLSchema" xmlns:p="http://schemas.microsoft.com/office/2006/metadata/properties" xmlns:ns2="71af3243-3dd4-4a8d-8c0d-dd76da1f02a5" xmlns:ns3="16c05727-aa75-4e4a-9b5f-8a80a1165891" targetNamespace="http://schemas.microsoft.com/office/2006/metadata/properties" ma:root="true" ma:fieldsID="8256c27c40ca5c40ce1cf6c44f0205df" ns2:_="" ns3:_="">
     <xsd:import namespace="71af3243-3dd4-4a8d-8c0d-dd76da1f02a5"/>
@@ -31909,6 +33651,15 @@
 </ct:contentTypeSchema>
 </file>
 
+<file path=customXml/item3.xml><?xml version="1.0" encoding="utf-8"?>
+<?mso-contentType ?>
+<FormTemplates xmlns="http://schemas.microsoft.com/sharepoint/v3/contenttype/forms">
+  <Display>DocumentLibraryForm</Display>
+  <Edit>DocumentLibraryForm</Edit>
+  <New>DocumentLibraryForm</New>
+</FormTemplates>
+</file>
+
 <file path=customXml/itemProps1.xml><?xml version="1.0" encoding="utf-8"?>
 <ds:datastoreItem xmlns:ds="http://schemas.openxmlformats.org/officeDocument/2006/customXml" ds:itemID="{F5757914-1161-4661-9696-421FD6935CDD}">
   <ds:schemaRefs>
@@ -31920,14 +33671,6 @@
 </file>
 
 <file path=customXml/itemProps2.xml><?xml version="1.0" encoding="utf-8"?>
-<ds:datastoreItem xmlns:ds="http://schemas.openxmlformats.org/officeDocument/2006/customXml" ds:itemID="{5B26E0C9-B2AA-42E6-97B6-E1B7D9EAF129}">
-  <ds:schemaRefs>
-    <ds:schemaRef ds:uri="http://schemas.microsoft.com/sharepoint/v3/contenttype/forms"/>
-  </ds:schemaRefs>
-</ds:datastoreItem>
-</file>
-
-<file path=customXml/itemProps3.xml><?xml version="1.0" encoding="utf-8"?>
 <ds:datastoreItem xmlns:ds="http://schemas.openxmlformats.org/officeDocument/2006/customXml" ds:itemID="{4C103400-4A22-4E35-B588-4C4D42638959}">
   <ds:schemaRefs>
     <ds:schemaRef ds:uri="http://schemas.microsoft.com/office/2006/metadata/contentType"/>
@@ -31944,4 +33687,12 @@
     <ds:schemaRef ds:uri="http://schemas.microsoft.com/internal/obd"/>
   </ds:schemaRefs>
 </ds:datastoreItem>
+</file>
+
+<file path=customXml/itemProps3.xml><?xml version="1.0" encoding="utf-8"?>
+<ds:datastoreItem xmlns:ds="http://schemas.openxmlformats.org/officeDocument/2006/customXml" ds:itemID="{5B26E0C9-B2AA-42E6-97B6-E1B7D9EAF129}">
+  <ds:schemaRefs>
+    <ds:schemaRef ds:uri="http://schemas.microsoft.com/sharepoint/v3/contenttype/forms"/>
+  </ds:schemaRefs>
+</ds:datastoreItem>
 </file>
</xml_diff>